<commit_message>
Database creation material improved for readability
</commit_message>
<xml_diff>
--- a/05_es6_node/NodeJS_demo/01_database/CreatingDatabase_for_IdeaCaseBackend.pptx
+++ b/05_es6_node/NodeJS_demo/01_database/CreatingDatabase_for_IdeaCaseBackend.pptx
@@ -5,7 +5,7 @@
     <p:sldMasterId id="2147483648" r:id="rId4"/>
   </p:sldMasterIdLst>
   <p:notesMasterIdLst>
-    <p:notesMasterId r:id="rId26"/>
+    <p:notesMasterId r:id="rId27"/>
   </p:notesMasterIdLst>
   <p:sldIdLst>
     <p:sldId id="256" r:id="rId5"/>
@@ -15,20 +15,21 @@
     <p:sldId id="260" r:id="rId9"/>
     <p:sldId id="261" r:id="rId10"/>
     <p:sldId id="262" r:id="rId11"/>
-    <p:sldId id="263" r:id="rId12"/>
-    <p:sldId id="266" r:id="rId13"/>
-    <p:sldId id="265" r:id="rId14"/>
-    <p:sldId id="267" r:id="rId15"/>
-    <p:sldId id="268" r:id="rId16"/>
-    <p:sldId id="269" r:id="rId17"/>
-    <p:sldId id="271" r:id="rId18"/>
-    <p:sldId id="272" r:id="rId19"/>
-    <p:sldId id="264" r:id="rId20"/>
-    <p:sldId id="270" r:id="rId21"/>
-    <p:sldId id="273" r:id="rId22"/>
-    <p:sldId id="274" r:id="rId23"/>
-    <p:sldId id="275" r:id="rId24"/>
-    <p:sldId id="276" r:id="rId25"/>
+    <p:sldId id="277" r:id="rId12"/>
+    <p:sldId id="263" r:id="rId13"/>
+    <p:sldId id="266" r:id="rId14"/>
+    <p:sldId id="265" r:id="rId15"/>
+    <p:sldId id="267" r:id="rId16"/>
+    <p:sldId id="268" r:id="rId17"/>
+    <p:sldId id="269" r:id="rId18"/>
+    <p:sldId id="271" r:id="rId19"/>
+    <p:sldId id="272" r:id="rId20"/>
+    <p:sldId id="264" r:id="rId21"/>
+    <p:sldId id="270" r:id="rId22"/>
+    <p:sldId id="273" r:id="rId23"/>
+    <p:sldId id="274" r:id="rId24"/>
+    <p:sldId id="275" r:id="rId25"/>
+    <p:sldId id="276" r:id="rId26"/>
   </p:sldIdLst>
   <p:sldSz cx="12192000" cy="6858000"/>
   <p:notesSz cx="6858000" cy="9144000"/>
@@ -1982,7 +1983,7 @@
           <a:p>
             <a:fld id="{5645C365-1C26-6946-87AF-75D6A7DF4277}" type="datetimeFigureOut">
               <a:rPr lang="en-GB" smtClean="0"/>
-              <a:t>05/02/2023</a:t>
+              <a:t>08/02/2023</a:t>
             </a:fld>
             <a:endParaRPr lang="en-GB"/>
           </a:p>
@@ -2481,7 +2482,7 @@
           <a:p>
             <a:fld id="{35B864B8-8D08-7B43-B4FB-B2FB41A5D9E3}" type="datetime1">
               <a:rPr lang="fi-FI" smtClean="0"/>
-              <a:t>5.2.2023</a:t>
+              <a:t>8.2.2023</a:t>
             </a:fld>
             <a:endParaRPr lang="en-GB" dirty="0"/>
           </a:p>
@@ -2808,7 +2809,7 @@
           <a:p>
             <a:fld id="{D5AEA85A-FC56-D34C-9AA6-ECC3D2586F37}" type="datetime1">
               <a:rPr lang="fi-FI" smtClean="0"/>
-              <a:t>5.2.2023</a:t>
+              <a:t>8.2.2023</a:t>
             </a:fld>
             <a:endParaRPr lang="en-GB" dirty="0"/>
           </a:p>
@@ -3018,7 +3019,7 @@
           <a:p>
             <a:fld id="{E6BC6EEF-E660-7844-8930-418AFF95EA40}" type="datetime1">
               <a:rPr lang="fi-FI" smtClean="0"/>
-              <a:t>5.2.2023</a:t>
+              <a:t>8.2.2023</a:t>
             </a:fld>
             <a:endParaRPr lang="en-GB" dirty="0"/>
           </a:p>
@@ -3327,7 +3328,7 @@
           <a:p>
             <a:fld id="{4E10C7EC-C1C1-9849-A573-7692478FCD52}" type="datetime1">
               <a:rPr lang="fi-FI" smtClean="0"/>
-              <a:t>5.2.2023</a:t>
+              <a:t>8.2.2023</a:t>
             </a:fld>
             <a:endParaRPr lang="en-GB" dirty="0"/>
           </a:p>
@@ -3600,7 +3601,7 @@
           <a:p>
             <a:fld id="{844FF3FE-30BE-2040-9151-6FBC4992BF4F}" type="datetime1">
               <a:rPr lang="fi-FI" smtClean="0"/>
-              <a:t>5.2.2023</a:t>
+              <a:t>8.2.2023</a:t>
             </a:fld>
             <a:endParaRPr lang="en-GB" dirty="0"/>
           </a:p>
@@ -3840,7 +3841,7 @@
           <a:p>
             <a:fld id="{11EDCD7B-6966-E249-89F2-D46BDFBF56BE}" type="datetime1">
               <a:rPr lang="fi-FI" smtClean="0"/>
-              <a:t>5.2.2023</a:t>
+              <a:t>8.2.2023</a:t>
             </a:fld>
             <a:endParaRPr lang="en-GB" dirty="0"/>
           </a:p>
@@ -4133,7 +4134,7 @@
           <a:p>
             <a:fld id="{11EDCD7B-6966-E249-89F2-D46BDFBF56BE}" type="datetime1">
               <a:rPr lang="fi-FI" smtClean="0"/>
-              <a:t>5.2.2023</a:t>
+              <a:t>8.2.2023</a:t>
             </a:fld>
             <a:endParaRPr lang="en-GB" dirty="0"/>
           </a:p>
@@ -4572,7 +4573,7 @@
           <a:p>
             <a:fld id="{844FF3FE-30BE-2040-9151-6FBC4992BF4F}" type="datetime1">
               <a:rPr lang="fi-FI" smtClean="0"/>
-              <a:t>5.2.2023</a:t>
+              <a:t>8.2.2023</a:t>
             </a:fld>
             <a:endParaRPr lang="en-GB" dirty="0"/>
           </a:p>
@@ -4800,7 +4801,7 @@
           <a:p>
             <a:fld id="{11EDCD7B-6966-E249-89F2-D46BDFBF56BE}" type="datetime1">
               <a:rPr lang="fi-FI" smtClean="0"/>
-              <a:t>5.2.2023</a:t>
+              <a:t>8.2.2023</a:t>
             </a:fld>
             <a:endParaRPr lang="en-GB" dirty="0"/>
           </a:p>
@@ -5215,7 +5216,7 @@
           <a:p>
             <a:fld id="{B62E192A-D52B-F541-B2AA-4AEB9388F1F7}" type="datetime1">
               <a:rPr lang="fi-FI" smtClean="0"/>
-              <a:t>5.2.2023</a:t>
+              <a:t>8.2.2023</a:t>
             </a:fld>
             <a:endParaRPr lang="en-GB" dirty="0"/>
           </a:p>
@@ -5515,7 +5516,7 @@
           <a:p>
             <a:fld id="{EEA4FAA2-2B3E-264C-A42F-2D6D3EF33A3C}" type="datetime1">
               <a:rPr lang="fi-FI" smtClean="0"/>
-              <a:t>5.2.2023</a:t>
+              <a:t>8.2.2023</a:t>
             </a:fld>
             <a:endParaRPr lang="en-GB" dirty="0"/>
           </a:p>
@@ -6418,7 +6419,7 @@
           <a:p>
             <a:fld id="{B3114A65-8017-1743-A85A-B2A4BB835AE9}" type="datetime1">
               <a:rPr lang="fi-FI" smtClean="0"/>
-              <a:t>5.2.2023</a:t>
+              <a:t>8.2.2023</a:t>
             </a:fld>
             <a:endParaRPr lang="en-GB" dirty="0"/>
           </a:p>
@@ -6646,7 +6647,7 @@
           <a:p>
             <a:fld id="{11EDCD7B-6966-E249-89F2-D46BDFBF56BE}" type="datetime1">
               <a:rPr lang="fi-FI" smtClean="0"/>
-              <a:t>5.2.2023</a:t>
+              <a:t>8.2.2023</a:t>
             </a:fld>
             <a:endParaRPr lang="en-GB" dirty="0"/>
           </a:p>
@@ -6938,7 +6939,7 @@
           <a:p>
             <a:fld id="{45F98643-D206-614D-B596-3C8548138211}" type="datetime1">
               <a:rPr lang="fi-FI" smtClean="0"/>
-              <a:t>5.2.2023</a:t>
+              <a:t>8.2.2023</a:t>
             </a:fld>
             <a:endParaRPr lang="en-GB" dirty="0"/>
           </a:p>
@@ -7583,7 +7584,7 @@
           <a:p>
             <a:fld id="{30BF63A1-919F-FB49-ABA8-182126D24C50}" type="datetime1">
               <a:rPr lang="fi-FI" smtClean="0"/>
-              <a:t>5.2.2023</a:t>
+              <a:t>8.2.2023</a:t>
             </a:fld>
             <a:endParaRPr lang="en-GB" dirty="0"/>
           </a:p>
@@ -7667,15 +7668,15 @@
           <a:p>
             <a:r>
               <a:rPr lang="en-US" dirty="0"/>
-              <a:t>3.1.1 Use </a:t>
+              <a:t>2. … and use </a:t>
             </a:r>
             <a:r>
               <a:rPr lang="en-US" dirty="0" err="1"/>
-              <a:t>DBeaver</a:t>
+              <a:t>ssh</a:t>
             </a:r>
             <a:r>
               <a:rPr lang="en-US" dirty="0"/>
-              <a:t> according to the pictures to create and test the connection</a:t>
+              <a:t> to create the tunnel</a:t>
             </a:r>
           </a:p>
         </p:txBody>
@@ -7703,7 +7704,7 @@
           <a:p>
             <a:fld id="{11EDCD7B-6966-E249-89F2-D46BDFBF56BE}" type="datetime1">
               <a:rPr lang="fi-FI" smtClean="0"/>
-              <a:t>5.2.2023</a:t>
+              <a:t>8.2.2023</a:t>
             </a:fld>
             <a:endParaRPr lang="en-GB" dirty="0"/>
           </a:p>
@@ -7758,6 +7759,256 @@
             <a:fld id="{76BAB7ED-EDE9-4D4B-9A2D-30E18C47C16E}" type="slidenum">
               <a:rPr lang="en-GB" smtClean="0"/>
               <a:t>10</a:t>
+            </a:fld>
+            <a:endParaRPr lang="en-GB" dirty="0"/>
+          </a:p>
+        </p:txBody>
+      </p:sp>
+      <p:pic>
+        <p:nvPicPr>
+          <p:cNvPr id="10" name="Content Placeholder 9">
+            <a:extLst>
+              <a:ext uri="{FF2B5EF4-FFF2-40B4-BE49-F238E27FC236}">
+                <a16:creationId xmlns:a16="http://schemas.microsoft.com/office/drawing/2014/main" id="{E75DF62D-C821-4436-80ED-B904E2C29647}"/>
+              </a:ext>
+            </a:extLst>
+          </p:cNvPr>
+          <p:cNvPicPr>
+            <a:picLocks noGrp="1" noChangeAspect="1"/>
+          </p:cNvPicPr>
+          <p:nvPr>
+            <p:ph sz="half" idx="2"/>
+          </p:nvPr>
+        </p:nvPicPr>
+        <p:blipFill>
+          <a:blip r:embed="rId2"/>
+          <a:stretch>
+            <a:fillRect/>
+          </a:stretch>
+        </p:blipFill>
+        <p:spPr>
+          <a:xfrm>
+            <a:off x="659170" y="1222884"/>
+            <a:ext cx="10516140" cy="2355971"/>
+          </a:xfrm>
+        </p:spPr>
+      </p:pic>
+      <p:pic>
+        <p:nvPicPr>
+          <p:cNvPr id="12" name="Picture 11">
+            <a:extLst>
+              <a:ext uri="{FF2B5EF4-FFF2-40B4-BE49-F238E27FC236}">
+                <a16:creationId xmlns:a16="http://schemas.microsoft.com/office/drawing/2014/main" id="{E7ABA486-BD10-4334-AAB0-FCB5D9C6F7AF}"/>
+              </a:ext>
+            </a:extLst>
+          </p:cNvPr>
+          <p:cNvPicPr>
+            <a:picLocks noChangeAspect="1"/>
+          </p:cNvPicPr>
+          <p:nvPr/>
+        </p:nvPicPr>
+        <p:blipFill>
+          <a:blip r:embed="rId3"/>
+          <a:stretch>
+            <a:fillRect/>
+          </a:stretch>
+        </p:blipFill>
+        <p:spPr>
+          <a:xfrm>
+            <a:off x="373620" y="4238421"/>
+            <a:ext cx="11189275" cy="1744271"/>
+          </a:xfrm>
+          <a:prstGeom prst="rect">
+            <a:avLst/>
+          </a:prstGeom>
+        </p:spPr>
+      </p:pic>
+      <p:sp>
+        <p:nvSpPr>
+          <p:cNvPr id="13" name="Rectangle 12">
+            <a:extLst>
+              <a:ext uri="{FF2B5EF4-FFF2-40B4-BE49-F238E27FC236}">
+                <a16:creationId xmlns:a16="http://schemas.microsoft.com/office/drawing/2014/main" id="{6F4FE023-1F2A-42D7-8DD2-AE1E0ED188B8}"/>
+              </a:ext>
+            </a:extLst>
+          </p:cNvPr>
+          <p:cNvSpPr/>
+          <p:nvPr/>
+        </p:nvSpPr>
+        <p:spPr>
+          <a:xfrm>
+            <a:off x="1292318" y="3699934"/>
+            <a:ext cx="8648521" cy="369332"/>
+          </a:xfrm>
+          <a:prstGeom prst="rect">
+            <a:avLst/>
+          </a:prstGeom>
+        </p:spPr>
+        <p:txBody>
+          <a:bodyPr wrap="none">
+            <a:spAutoFit/>
+          </a:bodyPr>
+          <a:lstStyle/>
+          <a:p>
+            <a:r>
+              <a:rPr lang="en-US" dirty="0"/>
+              <a:t>netstat -</a:t>
+            </a:r>
+            <a:r>
+              <a:rPr lang="en-US" dirty="0" err="1"/>
+              <a:t>aof</a:t>
+            </a:r>
+            <a:r>
+              <a:rPr lang="en-US" dirty="0"/>
+              <a:t> in Windows might take some time to produce results. Reason unknown.</a:t>
+            </a:r>
+          </a:p>
+        </p:txBody>
+      </p:sp>
+    </p:spTree>
+    <p:extLst>
+      <p:ext uri="{BB962C8B-B14F-4D97-AF65-F5344CB8AC3E}">
+        <p14:creationId xmlns:p14="http://schemas.microsoft.com/office/powerpoint/2010/main" val="1180610041"/>
+      </p:ext>
+    </p:extLst>
+  </p:cSld>
+  <p:clrMapOvr>
+    <a:masterClrMapping/>
+  </p:clrMapOvr>
+</p:sld>
+</file>
+
+<file path=ppt/slides/slide11.xml><?xml version="1.0" encoding="utf-8"?>
+<p:sld xmlns:a="http://schemas.openxmlformats.org/drawingml/2006/main" xmlns:r="http://schemas.openxmlformats.org/officeDocument/2006/relationships" xmlns:p="http://schemas.openxmlformats.org/presentationml/2006/main">
+  <p:cSld>
+    <p:spTree>
+      <p:nvGrpSpPr>
+        <p:cNvPr id="1" name=""/>
+        <p:cNvGrpSpPr/>
+        <p:nvPr/>
+      </p:nvGrpSpPr>
+      <p:grpSpPr>
+        <a:xfrm>
+          <a:off x="0" y="0"/>
+          <a:ext cx="0" cy="0"/>
+          <a:chOff x="0" y="0"/>
+          <a:chExt cx="0" cy="0"/>
+        </a:xfrm>
+      </p:grpSpPr>
+      <p:sp>
+        <p:nvSpPr>
+          <p:cNvPr id="2" name="Title 1">
+            <a:extLst>
+              <a:ext uri="{FF2B5EF4-FFF2-40B4-BE49-F238E27FC236}">
+                <a16:creationId xmlns:a16="http://schemas.microsoft.com/office/drawing/2014/main" id="{F717F6C3-2174-4E9B-955C-08E8869F5601}"/>
+              </a:ext>
+            </a:extLst>
+          </p:cNvPr>
+          <p:cNvSpPr>
+            <a:spLocks noGrp="1"/>
+          </p:cNvSpPr>
+          <p:nvPr>
+            <p:ph type="title"/>
+          </p:nvPr>
+        </p:nvSpPr>
+        <p:spPr/>
+        <p:txBody>
+          <a:bodyPr/>
+          <a:lstStyle/>
+          <a:p>
+            <a:r>
+              <a:rPr lang="en-US" dirty="0"/>
+              <a:t>3.1.1 Use </a:t>
+            </a:r>
+            <a:r>
+              <a:rPr lang="en-US" dirty="0" err="1"/>
+              <a:t>DBeaver</a:t>
+            </a:r>
+            <a:r>
+              <a:rPr lang="en-US" dirty="0"/>
+              <a:t> according to the pictures to create and test the connection</a:t>
+            </a:r>
+          </a:p>
+        </p:txBody>
+      </p:sp>
+      <p:sp>
+        <p:nvSpPr>
+          <p:cNvPr id="4" name="Date Placeholder 3">
+            <a:extLst>
+              <a:ext uri="{FF2B5EF4-FFF2-40B4-BE49-F238E27FC236}">
+                <a16:creationId xmlns:a16="http://schemas.microsoft.com/office/drawing/2014/main" id="{4AE3CAC3-EE86-41D2-A811-3C7D35077D71}"/>
+              </a:ext>
+            </a:extLst>
+          </p:cNvPr>
+          <p:cNvSpPr>
+            <a:spLocks noGrp="1"/>
+          </p:cNvSpPr>
+          <p:nvPr>
+            <p:ph type="dt" sz="half" idx="10"/>
+          </p:nvPr>
+        </p:nvSpPr>
+        <p:spPr/>
+        <p:txBody>
+          <a:bodyPr/>
+          <a:lstStyle/>
+          <a:p>
+            <a:fld id="{11EDCD7B-6966-E249-89F2-D46BDFBF56BE}" type="datetime1">
+              <a:rPr lang="fi-FI" smtClean="0"/>
+              <a:t>8.2.2023</a:t>
+            </a:fld>
+            <a:endParaRPr lang="en-GB" dirty="0"/>
+          </a:p>
+        </p:txBody>
+      </p:sp>
+      <p:sp>
+        <p:nvSpPr>
+          <p:cNvPr id="5" name="Footer Placeholder 4">
+            <a:extLst>
+              <a:ext uri="{FF2B5EF4-FFF2-40B4-BE49-F238E27FC236}">
+                <a16:creationId xmlns:a16="http://schemas.microsoft.com/office/drawing/2014/main" id="{D420ABA2-0CF6-4B8C-A7C9-12490622B01A}"/>
+              </a:ext>
+            </a:extLst>
+          </p:cNvPr>
+          <p:cNvSpPr>
+            <a:spLocks noGrp="1"/>
+          </p:cNvSpPr>
+          <p:nvPr>
+            <p:ph type="ftr" sz="quarter" idx="11"/>
+          </p:nvPr>
+        </p:nvSpPr>
+        <p:spPr/>
+        <p:txBody>
+          <a:bodyPr/>
+          <a:lstStyle/>
+          <a:p>
+            <a:endParaRPr lang="en-GB" dirty="0"/>
+          </a:p>
+        </p:txBody>
+      </p:sp>
+      <p:sp>
+        <p:nvSpPr>
+          <p:cNvPr id="6" name="Slide Number Placeholder 5">
+            <a:extLst>
+              <a:ext uri="{FF2B5EF4-FFF2-40B4-BE49-F238E27FC236}">
+                <a16:creationId xmlns:a16="http://schemas.microsoft.com/office/drawing/2014/main" id="{4A3EFC30-E71D-4610-89FC-4C1D766BE40E}"/>
+              </a:ext>
+            </a:extLst>
+          </p:cNvPr>
+          <p:cNvSpPr>
+            <a:spLocks noGrp="1"/>
+          </p:cNvSpPr>
+          <p:nvPr>
+            <p:ph type="sldNum" sz="quarter" idx="12"/>
+          </p:nvPr>
+        </p:nvSpPr>
+        <p:spPr/>
+        <p:txBody>
+          <a:bodyPr/>
+          <a:lstStyle/>
+          <a:p>
+            <a:fld id="{76BAB7ED-EDE9-4D4B-9A2D-30E18C47C16E}" type="slidenum">
+              <a:rPr lang="en-GB" smtClean="0"/>
+              <a:t>11</a:t>
             </a:fld>
             <a:endParaRPr lang="en-GB" dirty="0"/>
           </a:p>
@@ -7805,7 +8056,7 @@
 </p:sld>
 </file>
 
-<file path=ppt/slides/slide11.xml><?xml version="1.0" encoding="utf-8"?>
+<file path=ppt/slides/slide12.xml><?xml version="1.0" encoding="utf-8"?>
 <p:sld xmlns:a="http://schemas.openxmlformats.org/drawingml/2006/main" xmlns:r="http://schemas.openxmlformats.org/officeDocument/2006/relationships" xmlns:p="http://schemas.openxmlformats.org/presentationml/2006/main">
   <p:cSld>
     <p:spTree>
@@ -7881,7 +8132,7 @@
           <a:p>
             <a:fld id="{11EDCD7B-6966-E249-89F2-D46BDFBF56BE}" type="datetime1">
               <a:rPr lang="fi-FI" smtClean="0"/>
-              <a:t>5.2.2023</a:t>
+              <a:t>8.2.2023</a:t>
             </a:fld>
             <a:endParaRPr lang="en-GB" dirty="0"/>
           </a:p>
@@ -7935,7 +8186,7 @@
           <a:p>
             <a:fld id="{76BAB7ED-EDE9-4D4B-9A2D-30E18C47C16E}" type="slidenum">
               <a:rPr lang="en-GB" smtClean="0"/>
-              <a:t>11</a:t>
+              <a:t>12</a:t>
             </a:fld>
             <a:endParaRPr lang="en-GB" dirty="0"/>
           </a:p>
@@ -7983,7 +8234,7 @@
 </p:sld>
 </file>
 
-<file path=ppt/slides/slide12.xml><?xml version="1.0" encoding="utf-8"?>
+<file path=ppt/slides/slide13.xml><?xml version="1.0" encoding="utf-8"?>
 <p:sld xmlns:a="http://schemas.openxmlformats.org/drawingml/2006/main" xmlns:r="http://schemas.openxmlformats.org/officeDocument/2006/relationships" xmlns:p="http://schemas.openxmlformats.org/presentationml/2006/main">
   <p:cSld>
     <p:spTree>
@@ -8059,7 +8310,7 @@
           <a:p>
             <a:fld id="{11EDCD7B-6966-E249-89F2-D46BDFBF56BE}" type="datetime1">
               <a:rPr lang="fi-FI" smtClean="0"/>
-              <a:t>5.2.2023</a:t>
+              <a:t>8.2.2023</a:t>
             </a:fld>
             <a:endParaRPr lang="en-GB" dirty="0"/>
           </a:p>
@@ -8113,7 +8364,7 @@
           <a:p>
             <a:fld id="{76BAB7ED-EDE9-4D4B-9A2D-30E18C47C16E}" type="slidenum">
               <a:rPr lang="en-GB" smtClean="0"/>
-              <a:t>12</a:t>
+              <a:t>13</a:t>
             </a:fld>
             <a:endParaRPr lang="en-GB" dirty="0"/>
           </a:p>
@@ -8161,7 +8412,7 @@
 </p:sld>
 </file>
 
-<file path=ppt/slides/slide13.xml><?xml version="1.0" encoding="utf-8"?>
+<file path=ppt/slides/slide14.xml><?xml version="1.0" encoding="utf-8"?>
 <p:sld xmlns:a="http://schemas.openxmlformats.org/drawingml/2006/main" xmlns:r="http://schemas.openxmlformats.org/officeDocument/2006/relationships" xmlns:p="http://schemas.openxmlformats.org/presentationml/2006/main">
   <p:cSld>
     <p:spTree>
@@ -8237,7 +8488,7 @@
           <a:p>
             <a:fld id="{11EDCD7B-6966-E249-89F2-D46BDFBF56BE}" type="datetime1">
               <a:rPr lang="fi-FI" smtClean="0"/>
-              <a:t>5.2.2023</a:t>
+              <a:t>8.2.2023</a:t>
             </a:fld>
             <a:endParaRPr lang="en-GB" dirty="0"/>
           </a:p>
@@ -8291,7 +8542,7 @@
           <a:p>
             <a:fld id="{76BAB7ED-EDE9-4D4B-9A2D-30E18C47C16E}" type="slidenum">
               <a:rPr lang="en-GB" smtClean="0"/>
-              <a:t>13</a:t>
+              <a:t>14</a:t>
             </a:fld>
             <a:endParaRPr lang="en-GB" dirty="0"/>
           </a:p>
@@ -8339,177 +8590,6 @@
 </p:sld>
 </file>
 
-<file path=ppt/slides/slide14.xml><?xml version="1.0" encoding="utf-8"?>
-<p:sld xmlns:a="http://schemas.openxmlformats.org/drawingml/2006/main" xmlns:r="http://schemas.openxmlformats.org/officeDocument/2006/relationships" xmlns:p="http://schemas.openxmlformats.org/presentationml/2006/main">
-  <p:cSld>
-    <p:spTree>
-      <p:nvGrpSpPr>
-        <p:cNvPr id="1" name=""/>
-        <p:cNvGrpSpPr/>
-        <p:nvPr/>
-      </p:nvGrpSpPr>
-      <p:grpSpPr>
-        <a:xfrm>
-          <a:off x="0" y="0"/>
-          <a:ext cx="0" cy="0"/>
-          <a:chOff x="0" y="0"/>
-          <a:chExt cx="0" cy="0"/>
-        </a:xfrm>
-      </p:grpSpPr>
-      <p:sp>
-        <p:nvSpPr>
-          <p:cNvPr id="2" name="Title 1">
-            <a:extLst>
-              <a:ext uri="{FF2B5EF4-FFF2-40B4-BE49-F238E27FC236}">
-                <a16:creationId xmlns:a16="http://schemas.microsoft.com/office/drawing/2014/main" id="{F717F6C3-2174-4E9B-955C-08E8869F5601}"/>
-              </a:ext>
-            </a:extLst>
-          </p:cNvPr>
-          <p:cNvSpPr>
-            <a:spLocks noGrp="1"/>
-          </p:cNvSpPr>
-          <p:nvPr>
-            <p:ph type="title"/>
-          </p:nvPr>
-        </p:nvSpPr>
-        <p:spPr/>
-        <p:txBody>
-          <a:bodyPr/>
-          <a:lstStyle/>
-          <a:p>
-            <a:r>
-              <a:rPr lang="en-US" dirty="0"/>
-              <a:t>Here is how the database will look like:</a:t>
-            </a:r>
-          </a:p>
-        </p:txBody>
-      </p:sp>
-      <p:sp>
-        <p:nvSpPr>
-          <p:cNvPr id="4" name="Date Placeholder 3">
-            <a:extLst>
-              <a:ext uri="{FF2B5EF4-FFF2-40B4-BE49-F238E27FC236}">
-                <a16:creationId xmlns:a16="http://schemas.microsoft.com/office/drawing/2014/main" id="{4AE3CAC3-EE86-41D2-A811-3C7D35077D71}"/>
-              </a:ext>
-            </a:extLst>
-          </p:cNvPr>
-          <p:cNvSpPr>
-            <a:spLocks noGrp="1"/>
-          </p:cNvSpPr>
-          <p:nvPr>
-            <p:ph type="dt" sz="half" idx="10"/>
-          </p:nvPr>
-        </p:nvSpPr>
-        <p:spPr/>
-        <p:txBody>
-          <a:bodyPr/>
-          <a:lstStyle/>
-          <a:p>
-            <a:fld id="{11EDCD7B-6966-E249-89F2-D46BDFBF56BE}" type="datetime1">
-              <a:rPr lang="fi-FI" smtClean="0"/>
-              <a:t>5.2.2023</a:t>
-            </a:fld>
-            <a:endParaRPr lang="en-GB" dirty="0"/>
-          </a:p>
-        </p:txBody>
-      </p:sp>
-      <p:sp>
-        <p:nvSpPr>
-          <p:cNvPr id="5" name="Footer Placeholder 4">
-            <a:extLst>
-              <a:ext uri="{FF2B5EF4-FFF2-40B4-BE49-F238E27FC236}">
-                <a16:creationId xmlns:a16="http://schemas.microsoft.com/office/drawing/2014/main" id="{D420ABA2-0CF6-4B8C-A7C9-12490622B01A}"/>
-              </a:ext>
-            </a:extLst>
-          </p:cNvPr>
-          <p:cNvSpPr>
-            <a:spLocks noGrp="1"/>
-          </p:cNvSpPr>
-          <p:nvPr>
-            <p:ph type="ftr" sz="quarter" idx="11"/>
-          </p:nvPr>
-        </p:nvSpPr>
-        <p:spPr/>
-        <p:txBody>
-          <a:bodyPr/>
-          <a:lstStyle/>
-          <a:p>
-            <a:endParaRPr lang="en-GB" dirty="0"/>
-          </a:p>
-        </p:txBody>
-      </p:sp>
-      <p:sp>
-        <p:nvSpPr>
-          <p:cNvPr id="6" name="Slide Number Placeholder 5">
-            <a:extLst>
-              <a:ext uri="{FF2B5EF4-FFF2-40B4-BE49-F238E27FC236}">
-                <a16:creationId xmlns:a16="http://schemas.microsoft.com/office/drawing/2014/main" id="{4A3EFC30-E71D-4610-89FC-4C1D766BE40E}"/>
-              </a:ext>
-            </a:extLst>
-          </p:cNvPr>
-          <p:cNvSpPr>
-            <a:spLocks noGrp="1"/>
-          </p:cNvSpPr>
-          <p:nvPr>
-            <p:ph type="sldNum" sz="quarter" idx="12"/>
-          </p:nvPr>
-        </p:nvSpPr>
-        <p:spPr/>
-        <p:txBody>
-          <a:bodyPr/>
-          <a:lstStyle/>
-          <a:p>
-            <a:fld id="{76BAB7ED-EDE9-4D4B-9A2D-30E18C47C16E}" type="slidenum">
-              <a:rPr lang="en-GB" smtClean="0"/>
-              <a:t>14</a:t>
-            </a:fld>
-            <a:endParaRPr lang="en-GB" dirty="0"/>
-          </a:p>
-        </p:txBody>
-      </p:sp>
-      <p:pic>
-        <p:nvPicPr>
-          <p:cNvPr id="9" name="Picture 8">
-            <a:extLst>
-              <a:ext uri="{FF2B5EF4-FFF2-40B4-BE49-F238E27FC236}">
-                <a16:creationId xmlns:a16="http://schemas.microsoft.com/office/drawing/2014/main" id="{EEBCBA22-BF85-45AB-8821-244A85C54CC8}"/>
-              </a:ext>
-            </a:extLst>
-          </p:cNvPr>
-          <p:cNvPicPr>
-            <a:picLocks noChangeAspect="1"/>
-          </p:cNvPicPr>
-          <p:nvPr/>
-        </p:nvPicPr>
-        <p:blipFill>
-          <a:blip r:embed="rId2"/>
-          <a:stretch>
-            <a:fillRect/>
-          </a:stretch>
-        </p:blipFill>
-        <p:spPr>
-          <a:xfrm>
-            <a:off x="1220741" y="1161256"/>
-            <a:ext cx="9748367" cy="4834939"/>
-          </a:xfrm>
-          <a:prstGeom prst="rect">
-            <a:avLst/>
-          </a:prstGeom>
-        </p:spPr>
-      </p:pic>
-    </p:spTree>
-    <p:extLst>
-      <p:ext uri="{BB962C8B-B14F-4D97-AF65-F5344CB8AC3E}">
-        <p14:creationId xmlns:p14="http://schemas.microsoft.com/office/powerpoint/2010/main" val="148446685"/>
-      </p:ext>
-    </p:extLst>
-  </p:cSld>
-  <p:clrMapOvr>
-    <a:masterClrMapping/>
-  </p:clrMapOvr>
-</p:sld>
-</file>
-
 <file path=ppt/slides/slide15.xml><?xml version="1.0" encoding="utf-8"?>
 <p:sld xmlns:a="http://schemas.openxmlformats.org/drawingml/2006/main" xmlns:r="http://schemas.openxmlformats.org/officeDocument/2006/relationships" xmlns:p="http://schemas.openxmlformats.org/presentationml/2006/main">
   <p:cSld>
@@ -8543,14 +8623,19 @@
             <p:ph type="title"/>
           </p:nvPr>
         </p:nvSpPr>
-        <p:spPr/>
+        <p:spPr>
+          <a:xfrm>
+            <a:off x="966652" y="317836"/>
+            <a:ext cx="11125200" cy="1223963"/>
+          </a:xfrm>
+        </p:spPr>
         <p:txBody>
           <a:bodyPr/>
           <a:lstStyle/>
           <a:p>
             <a:r>
               <a:rPr lang="en-US" dirty="0"/>
-              <a:t>Download the SQL script for creating the database</a:t>
+              <a:t>Here is how the database will look like:</a:t>
             </a:r>
           </a:p>
         </p:txBody>
@@ -8578,7 +8663,7 @@
           <a:p>
             <a:fld id="{11EDCD7B-6966-E249-89F2-D46BDFBF56BE}" type="datetime1">
               <a:rPr lang="fi-FI" smtClean="0"/>
-              <a:t>5.2.2023</a:t>
+              <a:t>8.2.2023</a:t>
             </a:fld>
             <a:endParaRPr lang="en-GB" dirty="0"/>
           </a:p>
@@ -8635,72 +8720,6 @@
               <a:t>15</a:t>
             </a:fld>
             <a:endParaRPr lang="en-GB" dirty="0"/>
-          </a:p>
-        </p:txBody>
-      </p:sp>
-      <p:sp>
-        <p:nvSpPr>
-          <p:cNvPr id="7" name="Content Placeholder 6">
-            <a:extLst>
-              <a:ext uri="{FF2B5EF4-FFF2-40B4-BE49-F238E27FC236}">
-                <a16:creationId xmlns:a16="http://schemas.microsoft.com/office/drawing/2014/main" id="{4DB21722-508D-4AFF-A5E3-9FCE08E7C9C5}"/>
-              </a:ext>
-            </a:extLst>
-          </p:cNvPr>
-          <p:cNvSpPr>
-            <a:spLocks noGrp="1"/>
-          </p:cNvSpPr>
-          <p:nvPr>
-            <p:ph sz="half" idx="2"/>
-          </p:nvPr>
-        </p:nvSpPr>
-        <p:spPr/>
-        <p:txBody>
-          <a:bodyPr/>
-          <a:lstStyle/>
-          <a:p>
-            <a:r>
-              <a:rPr lang="en-US" dirty="0"/>
-              <a:t>Now download at least the </a:t>
-            </a:r>
-            <a:r>
-              <a:rPr lang="en-US" dirty="0">
-                <a:hlinkClick r:id="rId2"/>
-              </a:rPr>
-              <a:t>https://github.com/valju/idea-case-backend/blob/master/Database/SQL_Scripts/000_drop_create_insert.sql</a:t>
-            </a:r>
-            <a:r>
-              <a:rPr lang="en-US" dirty="0"/>
-              <a:t> this file to some known folder. </a:t>
-            </a:r>
-          </a:p>
-          <a:p>
-            <a:r>
-              <a:rPr lang="en-US" dirty="0"/>
-              <a:t>Or just clone the repo</a:t>
-            </a:r>
-          </a:p>
-          <a:p>
-            <a:r>
-              <a:rPr lang="en-US" dirty="0"/>
-              <a:t>It drops, creates and populates </a:t>
-            </a:r>
-            <a:br>
-              <a:rPr lang="en-US" dirty="0"/>
-            </a:br>
-            <a:r>
-              <a:rPr lang="en-US" dirty="0"/>
-              <a:t>the needed tables.</a:t>
-            </a:r>
-          </a:p>
-          <a:p>
-            <a:pPr marL="0" indent="0">
-              <a:buNone/>
-            </a:pPr>
-            <a:endParaRPr lang="en-US" dirty="0"/>
-          </a:p>
-          <a:p>
-            <a:endParaRPr lang="en-US" dirty="0"/>
           </a:p>
         </p:txBody>
       </p:sp>
@@ -8719,15 +8738,15 @@
           <p:nvPr/>
         </p:nvPicPr>
         <p:blipFill>
-          <a:blip r:embed="rId3"/>
+          <a:blip r:embed="rId2"/>
           <a:stretch>
             <a:fillRect/>
           </a:stretch>
         </p:blipFill>
         <p:spPr>
           <a:xfrm>
-            <a:off x="4034103" y="2429602"/>
-            <a:ext cx="5987673" cy="3604619"/>
+            <a:off x="1105989" y="1018904"/>
+            <a:ext cx="10014857" cy="5091360"/>
           </a:xfrm>
           <a:prstGeom prst="rect">
             <a:avLst/>
@@ -8737,7 +8756,7 @@
     </p:spTree>
     <p:extLst>
       <p:ext uri="{BB962C8B-B14F-4D97-AF65-F5344CB8AC3E}">
-        <p14:creationId xmlns:p14="http://schemas.microsoft.com/office/powerpoint/2010/main" val="531535799"/>
+        <p14:creationId xmlns:p14="http://schemas.microsoft.com/office/powerpoint/2010/main" val="148446685"/>
       </p:ext>
     </p:extLst>
   </p:cSld>
@@ -8787,15 +8806,7 @@
           <a:p>
             <a:r>
               <a:rPr lang="en-US" dirty="0"/>
-              <a:t>3.2.1 Use </a:t>
-            </a:r>
-            <a:r>
-              <a:rPr lang="en-US" dirty="0" err="1"/>
-              <a:t>DBeaver</a:t>
-            </a:r>
-            <a:r>
-              <a:rPr lang="en-US" dirty="0"/>
-              <a:t> to run SQL to create the tables and populate with test data</a:t>
+              <a:t>Download the SQL script for creating the database</a:t>
             </a:r>
           </a:p>
         </p:txBody>
@@ -8823,7 +8834,7 @@
           <a:p>
             <a:fld id="{11EDCD7B-6966-E249-89F2-D46BDFBF56BE}" type="datetime1">
               <a:rPr lang="fi-FI" smtClean="0"/>
-              <a:t>5.2.2023</a:t>
+              <a:t>8.2.2023</a:t>
             </a:fld>
             <a:endParaRPr lang="en-GB" dirty="0"/>
           </a:p>
@@ -8883,39 +8894,106 @@
           </a:p>
         </p:txBody>
       </p:sp>
+      <p:sp>
+        <p:nvSpPr>
+          <p:cNvPr id="7" name="Content Placeholder 6">
+            <a:extLst>
+              <a:ext uri="{FF2B5EF4-FFF2-40B4-BE49-F238E27FC236}">
+                <a16:creationId xmlns:a16="http://schemas.microsoft.com/office/drawing/2014/main" id="{4DB21722-508D-4AFF-A5E3-9FCE08E7C9C5}"/>
+              </a:ext>
+            </a:extLst>
+          </p:cNvPr>
+          <p:cNvSpPr>
+            <a:spLocks noGrp="1"/>
+          </p:cNvSpPr>
+          <p:nvPr>
+            <p:ph sz="half" idx="2"/>
+          </p:nvPr>
+        </p:nvSpPr>
+        <p:spPr/>
+        <p:txBody>
+          <a:bodyPr/>
+          <a:lstStyle/>
+          <a:p>
+            <a:r>
+              <a:rPr lang="en-US" dirty="0"/>
+              <a:t>Now download at least the </a:t>
+            </a:r>
+            <a:r>
+              <a:rPr lang="en-US" dirty="0">
+                <a:hlinkClick r:id="rId2"/>
+              </a:rPr>
+              <a:t>https://github.com/valju/idea-case-backend/blob/master/Database/SQL_Scripts/000_drop_create_insert.sql</a:t>
+            </a:r>
+            <a:r>
+              <a:rPr lang="en-US" dirty="0"/>
+              <a:t> this file to some known folder. </a:t>
+            </a:r>
+          </a:p>
+          <a:p>
+            <a:r>
+              <a:rPr lang="en-US" dirty="0"/>
+              <a:t>Or just clone the repo</a:t>
+            </a:r>
+          </a:p>
+          <a:p>
+            <a:r>
+              <a:rPr lang="en-US" dirty="0"/>
+              <a:t>It drops, creates and populates </a:t>
+            </a:r>
+            <a:br>
+              <a:rPr lang="en-US" dirty="0"/>
+            </a:br>
+            <a:r>
+              <a:rPr lang="en-US" dirty="0"/>
+              <a:t>the needed tables.</a:t>
+            </a:r>
+          </a:p>
+          <a:p>
+            <a:pPr marL="0" indent="0">
+              <a:buNone/>
+            </a:pPr>
+            <a:endParaRPr lang="en-US" dirty="0"/>
+          </a:p>
+          <a:p>
+            <a:endParaRPr lang="en-US" dirty="0"/>
+          </a:p>
+        </p:txBody>
+      </p:sp>
       <p:pic>
         <p:nvPicPr>
-          <p:cNvPr id="10" name="Content Placeholder 9">
-            <a:extLst>
-              <a:ext uri="{FF2B5EF4-FFF2-40B4-BE49-F238E27FC236}">
-                <a16:creationId xmlns:a16="http://schemas.microsoft.com/office/drawing/2014/main" id="{149C4C31-BF93-4F67-8EFD-89127E82DA9E}"/>
+          <p:cNvPr id="9" name="Picture 8">
+            <a:extLst>
+              <a:ext uri="{FF2B5EF4-FFF2-40B4-BE49-F238E27FC236}">
+                <a16:creationId xmlns:a16="http://schemas.microsoft.com/office/drawing/2014/main" id="{EEBCBA22-BF85-45AB-8821-244A85C54CC8}"/>
               </a:ext>
             </a:extLst>
           </p:cNvPr>
           <p:cNvPicPr>
-            <a:picLocks noGrp="1" noChangeAspect="1"/>
+            <a:picLocks noChangeAspect="1"/>
           </p:cNvPicPr>
-          <p:nvPr>
-            <p:ph sz="half" idx="2"/>
-          </p:nvPr>
+          <p:nvPr/>
         </p:nvPicPr>
         <p:blipFill>
-          <a:blip r:embed="rId2"/>
+          <a:blip r:embed="rId3"/>
           <a:stretch>
             <a:fillRect/>
           </a:stretch>
         </p:blipFill>
         <p:spPr>
           <a:xfrm>
-            <a:off x="3104250" y="1773238"/>
-            <a:ext cx="5593719" cy="4354737"/>
+            <a:off x="4034103" y="2429602"/>
+            <a:ext cx="5987672" cy="3604619"/>
           </a:xfrm>
+          <a:prstGeom prst="rect">
+            <a:avLst/>
+          </a:prstGeom>
         </p:spPr>
       </p:pic>
     </p:spTree>
     <p:extLst>
       <p:ext uri="{BB962C8B-B14F-4D97-AF65-F5344CB8AC3E}">
-        <p14:creationId xmlns:p14="http://schemas.microsoft.com/office/powerpoint/2010/main" val="4029749000"/>
+        <p14:creationId xmlns:p14="http://schemas.microsoft.com/office/powerpoint/2010/main" val="531535799"/>
       </p:ext>
     </p:extLst>
   </p:cSld>
@@ -8965,7 +9043,7 @@
           <a:p>
             <a:r>
               <a:rPr lang="en-US" dirty="0"/>
-              <a:t>3.2.2 Use </a:t>
+              <a:t>3.2.1 Use </a:t>
             </a:r>
             <a:r>
               <a:rPr lang="en-US" dirty="0" err="1"/>
@@ -9001,7 +9079,7 @@
           <a:p>
             <a:fld id="{11EDCD7B-6966-E249-89F2-D46BDFBF56BE}" type="datetime1">
               <a:rPr lang="fi-FI" smtClean="0"/>
-              <a:t>5.2.2023</a:t>
+              <a:t>8.2.2023</a:t>
             </a:fld>
             <a:endParaRPr lang="en-GB" dirty="0"/>
           </a:p>
@@ -9085,15 +9163,15 @@
         </p:blipFill>
         <p:spPr>
           <a:xfrm>
-            <a:off x="2680409" y="1573710"/>
-            <a:ext cx="6998231" cy="4455144"/>
+            <a:off x="1724297" y="1485380"/>
+            <a:ext cx="8438606" cy="4642596"/>
           </a:xfrm>
         </p:spPr>
       </p:pic>
     </p:spTree>
     <p:extLst>
       <p:ext uri="{BB962C8B-B14F-4D97-AF65-F5344CB8AC3E}">
-        <p14:creationId xmlns:p14="http://schemas.microsoft.com/office/powerpoint/2010/main" val="3733983080"/>
+        <p14:creationId xmlns:p14="http://schemas.microsoft.com/office/powerpoint/2010/main" val="4029749000"/>
       </p:ext>
     </p:extLst>
   </p:cSld>
@@ -9143,7 +9221,7 @@
           <a:p>
             <a:r>
               <a:rPr lang="en-US" dirty="0"/>
-              <a:t>3.2.3 Use </a:t>
+              <a:t>3.2.2 Use </a:t>
             </a:r>
             <a:r>
               <a:rPr lang="en-US" dirty="0" err="1"/>
@@ -9179,7 +9257,7 @@
           <a:p>
             <a:fld id="{11EDCD7B-6966-E249-89F2-D46BDFBF56BE}" type="datetime1">
               <a:rPr lang="fi-FI" smtClean="0"/>
-              <a:t>5.2.2023</a:t>
+              <a:t>8.2.2023</a:t>
             </a:fld>
             <a:endParaRPr lang="en-GB" dirty="0"/>
           </a:p>
@@ -9234,6 +9312,184 @@
             <a:fld id="{76BAB7ED-EDE9-4D4B-9A2D-30E18C47C16E}" type="slidenum">
               <a:rPr lang="en-GB" smtClean="0"/>
               <a:t>18</a:t>
+            </a:fld>
+            <a:endParaRPr lang="en-GB" dirty="0"/>
+          </a:p>
+        </p:txBody>
+      </p:sp>
+      <p:pic>
+        <p:nvPicPr>
+          <p:cNvPr id="10" name="Content Placeholder 9">
+            <a:extLst>
+              <a:ext uri="{FF2B5EF4-FFF2-40B4-BE49-F238E27FC236}">
+                <a16:creationId xmlns:a16="http://schemas.microsoft.com/office/drawing/2014/main" id="{149C4C31-BF93-4F67-8EFD-89127E82DA9E}"/>
+              </a:ext>
+            </a:extLst>
+          </p:cNvPr>
+          <p:cNvPicPr>
+            <a:picLocks noGrp="1" noChangeAspect="1"/>
+          </p:cNvPicPr>
+          <p:nvPr>
+            <p:ph sz="half" idx="2"/>
+          </p:nvPr>
+        </p:nvPicPr>
+        <p:blipFill>
+          <a:blip r:embed="rId2"/>
+          <a:stretch>
+            <a:fillRect/>
+          </a:stretch>
+        </p:blipFill>
+        <p:spPr>
+          <a:xfrm>
+            <a:off x="1915886" y="1573710"/>
+            <a:ext cx="8255725" cy="4570402"/>
+          </a:xfrm>
+        </p:spPr>
+      </p:pic>
+    </p:spTree>
+    <p:extLst>
+      <p:ext uri="{BB962C8B-B14F-4D97-AF65-F5344CB8AC3E}">
+        <p14:creationId xmlns:p14="http://schemas.microsoft.com/office/powerpoint/2010/main" val="3733983080"/>
+      </p:ext>
+    </p:extLst>
+  </p:cSld>
+  <p:clrMapOvr>
+    <a:masterClrMapping/>
+  </p:clrMapOvr>
+</p:sld>
+</file>
+
+<file path=ppt/slides/slide19.xml><?xml version="1.0" encoding="utf-8"?>
+<p:sld xmlns:a="http://schemas.openxmlformats.org/drawingml/2006/main" xmlns:r="http://schemas.openxmlformats.org/officeDocument/2006/relationships" xmlns:p="http://schemas.openxmlformats.org/presentationml/2006/main">
+  <p:cSld>
+    <p:spTree>
+      <p:nvGrpSpPr>
+        <p:cNvPr id="1" name=""/>
+        <p:cNvGrpSpPr/>
+        <p:nvPr/>
+      </p:nvGrpSpPr>
+      <p:grpSpPr>
+        <a:xfrm>
+          <a:off x="0" y="0"/>
+          <a:ext cx="0" cy="0"/>
+          <a:chOff x="0" y="0"/>
+          <a:chExt cx="0" cy="0"/>
+        </a:xfrm>
+      </p:grpSpPr>
+      <p:sp>
+        <p:nvSpPr>
+          <p:cNvPr id="2" name="Title 1">
+            <a:extLst>
+              <a:ext uri="{FF2B5EF4-FFF2-40B4-BE49-F238E27FC236}">
+                <a16:creationId xmlns:a16="http://schemas.microsoft.com/office/drawing/2014/main" id="{F717F6C3-2174-4E9B-955C-08E8869F5601}"/>
+              </a:ext>
+            </a:extLst>
+          </p:cNvPr>
+          <p:cNvSpPr>
+            <a:spLocks noGrp="1"/>
+          </p:cNvSpPr>
+          <p:nvPr>
+            <p:ph type="title"/>
+          </p:nvPr>
+        </p:nvSpPr>
+        <p:spPr/>
+        <p:txBody>
+          <a:bodyPr/>
+          <a:lstStyle/>
+          <a:p>
+            <a:r>
+              <a:rPr lang="en-US" dirty="0"/>
+              <a:t>3.2.3 Use </a:t>
+            </a:r>
+            <a:r>
+              <a:rPr lang="en-US" dirty="0" err="1"/>
+              <a:t>DBeaver</a:t>
+            </a:r>
+            <a:r>
+              <a:rPr lang="en-US" dirty="0"/>
+              <a:t> to run SQL to create the tables and populate with test data</a:t>
+            </a:r>
+          </a:p>
+        </p:txBody>
+      </p:sp>
+      <p:sp>
+        <p:nvSpPr>
+          <p:cNvPr id="4" name="Date Placeholder 3">
+            <a:extLst>
+              <a:ext uri="{FF2B5EF4-FFF2-40B4-BE49-F238E27FC236}">
+                <a16:creationId xmlns:a16="http://schemas.microsoft.com/office/drawing/2014/main" id="{4AE3CAC3-EE86-41D2-A811-3C7D35077D71}"/>
+              </a:ext>
+            </a:extLst>
+          </p:cNvPr>
+          <p:cNvSpPr>
+            <a:spLocks noGrp="1"/>
+          </p:cNvSpPr>
+          <p:nvPr>
+            <p:ph type="dt" sz="half" idx="10"/>
+          </p:nvPr>
+        </p:nvSpPr>
+        <p:spPr/>
+        <p:txBody>
+          <a:bodyPr/>
+          <a:lstStyle/>
+          <a:p>
+            <a:fld id="{11EDCD7B-6966-E249-89F2-D46BDFBF56BE}" type="datetime1">
+              <a:rPr lang="fi-FI" smtClean="0"/>
+              <a:t>8.2.2023</a:t>
+            </a:fld>
+            <a:endParaRPr lang="en-GB" dirty="0"/>
+          </a:p>
+        </p:txBody>
+      </p:sp>
+      <p:sp>
+        <p:nvSpPr>
+          <p:cNvPr id="5" name="Footer Placeholder 4">
+            <a:extLst>
+              <a:ext uri="{FF2B5EF4-FFF2-40B4-BE49-F238E27FC236}">
+                <a16:creationId xmlns:a16="http://schemas.microsoft.com/office/drawing/2014/main" id="{D420ABA2-0CF6-4B8C-A7C9-12490622B01A}"/>
+              </a:ext>
+            </a:extLst>
+          </p:cNvPr>
+          <p:cNvSpPr>
+            <a:spLocks noGrp="1"/>
+          </p:cNvSpPr>
+          <p:nvPr>
+            <p:ph type="ftr" sz="quarter" idx="11"/>
+          </p:nvPr>
+        </p:nvSpPr>
+        <p:spPr/>
+        <p:txBody>
+          <a:bodyPr/>
+          <a:lstStyle/>
+          <a:p>
+            <a:endParaRPr lang="en-GB" dirty="0"/>
+          </a:p>
+        </p:txBody>
+      </p:sp>
+      <p:sp>
+        <p:nvSpPr>
+          <p:cNvPr id="6" name="Slide Number Placeholder 5">
+            <a:extLst>
+              <a:ext uri="{FF2B5EF4-FFF2-40B4-BE49-F238E27FC236}">
+                <a16:creationId xmlns:a16="http://schemas.microsoft.com/office/drawing/2014/main" id="{4A3EFC30-E71D-4610-89FC-4C1D766BE40E}"/>
+              </a:ext>
+            </a:extLst>
+          </p:cNvPr>
+          <p:cNvSpPr>
+            <a:spLocks noGrp="1"/>
+          </p:cNvSpPr>
+          <p:nvPr>
+            <p:ph type="sldNum" sz="quarter" idx="12"/>
+          </p:nvPr>
+        </p:nvSpPr>
+        <p:spPr/>
+        <p:txBody>
+          <a:bodyPr/>
+          <a:lstStyle/>
+          <a:p>
+            <a:fld id="{76BAB7ED-EDE9-4D4B-9A2D-30E18C47C16E}" type="slidenum">
+              <a:rPr lang="en-GB" smtClean="0"/>
+              <a:t>19</a:t>
             </a:fld>
             <a:endParaRPr lang="en-GB" dirty="0"/>
           </a:p>
@@ -9281,184 +9537,6 @@
 </p:sld>
 </file>
 
-<file path=ppt/slides/slide19.xml><?xml version="1.0" encoding="utf-8"?>
-<p:sld xmlns:a="http://schemas.openxmlformats.org/drawingml/2006/main" xmlns:r="http://schemas.openxmlformats.org/officeDocument/2006/relationships" xmlns:p="http://schemas.openxmlformats.org/presentationml/2006/main">
-  <p:cSld>
-    <p:spTree>
-      <p:nvGrpSpPr>
-        <p:cNvPr id="1" name=""/>
-        <p:cNvGrpSpPr/>
-        <p:nvPr/>
-      </p:nvGrpSpPr>
-      <p:grpSpPr>
-        <a:xfrm>
-          <a:off x="0" y="0"/>
-          <a:ext cx="0" cy="0"/>
-          <a:chOff x="0" y="0"/>
-          <a:chExt cx="0" cy="0"/>
-        </a:xfrm>
-      </p:grpSpPr>
-      <p:sp>
-        <p:nvSpPr>
-          <p:cNvPr id="2" name="Title 1">
-            <a:extLst>
-              <a:ext uri="{FF2B5EF4-FFF2-40B4-BE49-F238E27FC236}">
-                <a16:creationId xmlns:a16="http://schemas.microsoft.com/office/drawing/2014/main" id="{F717F6C3-2174-4E9B-955C-08E8869F5601}"/>
-              </a:ext>
-            </a:extLst>
-          </p:cNvPr>
-          <p:cNvSpPr>
-            <a:spLocks noGrp="1"/>
-          </p:cNvSpPr>
-          <p:nvPr>
-            <p:ph type="title"/>
-          </p:nvPr>
-        </p:nvSpPr>
-        <p:spPr/>
-        <p:txBody>
-          <a:bodyPr/>
-          <a:lstStyle/>
-          <a:p>
-            <a:r>
-              <a:rPr lang="en-US" dirty="0"/>
-              <a:t>3.2.4 Use </a:t>
-            </a:r>
-            <a:r>
-              <a:rPr lang="en-US" dirty="0" err="1"/>
-              <a:t>DBeaver</a:t>
-            </a:r>
-            <a:r>
-              <a:rPr lang="en-US" dirty="0"/>
-              <a:t> to run SQL to create the tables and populate with test data</a:t>
-            </a:r>
-          </a:p>
-        </p:txBody>
-      </p:sp>
-      <p:sp>
-        <p:nvSpPr>
-          <p:cNvPr id="4" name="Date Placeholder 3">
-            <a:extLst>
-              <a:ext uri="{FF2B5EF4-FFF2-40B4-BE49-F238E27FC236}">
-                <a16:creationId xmlns:a16="http://schemas.microsoft.com/office/drawing/2014/main" id="{4AE3CAC3-EE86-41D2-A811-3C7D35077D71}"/>
-              </a:ext>
-            </a:extLst>
-          </p:cNvPr>
-          <p:cNvSpPr>
-            <a:spLocks noGrp="1"/>
-          </p:cNvSpPr>
-          <p:nvPr>
-            <p:ph type="dt" sz="half" idx="10"/>
-          </p:nvPr>
-        </p:nvSpPr>
-        <p:spPr/>
-        <p:txBody>
-          <a:bodyPr/>
-          <a:lstStyle/>
-          <a:p>
-            <a:fld id="{11EDCD7B-6966-E249-89F2-D46BDFBF56BE}" type="datetime1">
-              <a:rPr lang="fi-FI" smtClean="0"/>
-              <a:t>5.2.2023</a:t>
-            </a:fld>
-            <a:endParaRPr lang="en-GB" dirty="0"/>
-          </a:p>
-        </p:txBody>
-      </p:sp>
-      <p:sp>
-        <p:nvSpPr>
-          <p:cNvPr id="5" name="Footer Placeholder 4">
-            <a:extLst>
-              <a:ext uri="{FF2B5EF4-FFF2-40B4-BE49-F238E27FC236}">
-                <a16:creationId xmlns:a16="http://schemas.microsoft.com/office/drawing/2014/main" id="{D420ABA2-0CF6-4B8C-A7C9-12490622B01A}"/>
-              </a:ext>
-            </a:extLst>
-          </p:cNvPr>
-          <p:cNvSpPr>
-            <a:spLocks noGrp="1"/>
-          </p:cNvSpPr>
-          <p:nvPr>
-            <p:ph type="ftr" sz="quarter" idx="11"/>
-          </p:nvPr>
-        </p:nvSpPr>
-        <p:spPr/>
-        <p:txBody>
-          <a:bodyPr/>
-          <a:lstStyle/>
-          <a:p>
-            <a:endParaRPr lang="en-GB" dirty="0"/>
-          </a:p>
-        </p:txBody>
-      </p:sp>
-      <p:sp>
-        <p:nvSpPr>
-          <p:cNvPr id="6" name="Slide Number Placeholder 5">
-            <a:extLst>
-              <a:ext uri="{FF2B5EF4-FFF2-40B4-BE49-F238E27FC236}">
-                <a16:creationId xmlns:a16="http://schemas.microsoft.com/office/drawing/2014/main" id="{4A3EFC30-E71D-4610-89FC-4C1D766BE40E}"/>
-              </a:ext>
-            </a:extLst>
-          </p:cNvPr>
-          <p:cNvSpPr>
-            <a:spLocks noGrp="1"/>
-          </p:cNvSpPr>
-          <p:nvPr>
-            <p:ph type="sldNum" sz="quarter" idx="12"/>
-          </p:nvPr>
-        </p:nvSpPr>
-        <p:spPr/>
-        <p:txBody>
-          <a:bodyPr/>
-          <a:lstStyle/>
-          <a:p>
-            <a:fld id="{76BAB7ED-EDE9-4D4B-9A2D-30E18C47C16E}" type="slidenum">
-              <a:rPr lang="en-GB" smtClean="0"/>
-              <a:t>19</a:t>
-            </a:fld>
-            <a:endParaRPr lang="en-GB" dirty="0"/>
-          </a:p>
-        </p:txBody>
-      </p:sp>
-      <p:pic>
-        <p:nvPicPr>
-          <p:cNvPr id="10" name="Content Placeholder 9">
-            <a:extLst>
-              <a:ext uri="{FF2B5EF4-FFF2-40B4-BE49-F238E27FC236}">
-                <a16:creationId xmlns:a16="http://schemas.microsoft.com/office/drawing/2014/main" id="{149C4C31-BF93-4F67-8EFD-89127E82DA9E}"/>
-              </a:ext>
-            </a:extLst>
-          </p:cNvPr>
-          <p:cNvPicPr>
-            <a:picLocks noGrp="1" noChangeAspect="1"/>
-          </p:cNvPicPr>
-          <p:nvPr>
-            <p:ph sz="half" idx="2"/>
-          </p:nvPr>
-        </p:nvPicPr>
-        <p:blipFill>
-          <a:blip r:embed="rId2"/>
-          <a:stretch>
-            <a:fillRect/>
-          </a:stretch>
-        </p:blipFill>
-        <p:spPr>
-          <a:xfrm>
-            <a:off x="1672865" y="1632577"/>
-            <a:ext cx="8339996" cy="4152082"/>
-          </a:xfrm>
-        </p:spPr>
-      </p:pic>
-    </p:spTree>
-    <p:extLst>
-      <p:ext uri="{BB962C8B-B14F-4D97-AF65-F5344CB8AC3E}">
-        <p14:creationId xmlns:p14="http://schemas.microsoft.com/office/powerpoint/2010/main" val="2027056133"/>
-      </p:ext>
-    </p:extLst>
-  </p:cSld>
-  <p:clrMapOvr>
-    <a:masterClrMapping/>
-  </p:clrMapOvr>
-</p:sld>
-</file>
-
 <file path=ppt/slides/slide2.xml><?xml version="1.0" encoding="utf-8"?>
 <p:sld xmlns:a="http://schemas.openxmlformats.org/drawingml/2006/main" xmlns:r="http://schemas.openxmlformats.org/officeDocument/2006/relationships" xmlns:p="http://schemas.openxmlformats.org/presentationml/2006/main">
   <p:cSld>
@@ -9506,7 +9584,7 @@
           <a:p>
             <a:r>
               <a:rPr lang="fi-FI" dirty="0"/>
-              <a:t>1. </a:t>
+              <a:t>0. </a:t>
             </a:r>
             <a:r>
               <a:rPr lang="fi-FI" dirty="0" err="1"/>
@@ -9613,7 +9691,19 @@
             </a:r>
             <a:r>
               <a:rPr lang="fi-FI" sz="2000" dirty="0"/>
-              <a:t> CSC </a:t>
+              <a:t> </a:t>
+            </a:r>
+            <a:r>
+              <a:rPr lang="fi-FI" sz="2000" b="1" dirty="0" err="1"/>
+              <a:t>CSC</a:t>
+            </a:r>
+            <a:r>
+              <a:rPr lang="fi-FI" sz="2000" dirty="0" err="1"/>
+              <a:t>’s</a:t>
+            </a:r>
+            <a:r>
+              <a:rPr lang="fi-FI" sz="2000" dirty="0"/>
+              <a:t> </a:t>
             </a:r>
             <a:r>
               <a:rPr lang="fi-FI" sz="2000" dirty="0" err="1"/>
@@ -9633,7 +9723,7 @@
             </a:r>
             <a:r>
               <a:rPr lang="fi-FI" sz="2000" dirty="0" err="1"/>
-              <a:t>machines</a:t>
+              <a:t>machine</a:t>
             </a:r>
             <a:r>
               <a:rPr lang="fi-FI" sz="2000" dirty="0"/>
@@ -9693,7 +9783,7 @@
             </a:r>
             <a:r>
               <a:rPr lang="fi-FI" sz="2000" dirty="0"/>
-              <a:t> </a:t>
+              <a:t> is </a:t>
             </a:r>
             <a:r>
               <a:rPr lang="fi-FI" sz="2000" dirty="0" err="1"/>
@@ -9701,7 +9791,15 @@
             </a:r>
             <a:r>
               <a:rPr lang="fi-FI" sz="2000" dirty="0"/>
-              <a:t>:</a:t>
+              <a:t>: (extra </a:t>
+            </a:r>
+            <a:r>
+              <a:rPr lang="fi-FI" sz="2000" dirty="0" err="1"/>
+              <a:t>information</a:t>
+            </a:r>
+            <a:r>
+              <a:rPr lang="fi-FI" sz="2000" dirty="0"/>
+              <a:t>)</a:t>
             </a:r>
           </a:p>
           <a:p>
@@ -9801,7 +9899,15 @@
             </a:r>
             <a:r>
               <a:rPr lang="fi-FI" sz="2000" dirty="0"/>
-              <a:t> 70 </a:t>
+              <a:t> </a:t>
+            </a:r>
+            <a:r>
+              <a:rPr lang="fi-FI" sz="2000" dirty="0" err="1"/>
+              <a:t>MariaDB</a:t>
+            </a:r>
+            <a:r>
+              <a:rPr lang="fi-FI" sz="2000" dirty="0"/>
+              <a:t>, and 70 </a:t>
             </a:r>
             <a:r>
               <a:rPr lang="fi-FI" sz="2000" dirty="0" err="1"/>
@@ -9809,7 +9915,7 @@
             </a:r>
             <a:r>
               <a:rPr lang="fi-FI" sz="2000" dirty="0"/>
-              <a:t> and 70 </a:t>
+              <a:t> and </a:t>
             </a:r>
             <a:r>
               <a:rPr lang="fi-FI" sz="2000" dirty="0" err="1"/>
@@ -9818,6 +9924,14 @@
             <a:r>
               <a:rPr lang="fi-FI" sz="2000" dirty="0"/>
               <a:t> to </a:t>
+            </a:r>
+            <a:r>
+              <a:rPr lang="fi-FI" sz="2000" dirty="0" err="1"/>
+              <a:t>that</a:t>
+            </a:r>
+            <a:r>
+              <a:rPr lang="fi-FI" sz="2000" dirty="0"/>
+              <a:t> </a:t>
             </a:r>
             <a:r>
               <a:rPr lang="fi-FI" sz="2000" dirty="0" err="1"/>
@@ -9870,7 +9984,7 @@
           <a:p>
             <a:fld id="{202E1EC2-47B8-044B-A09E-6A63B4D80C87}" type="datetime1">
               <a:rPr lang="fi-FI" smtClean="0"/>
-              <a:t>5.2.2023</a:t>
+              <a:t>8.2.2023</a:t>
             </a:fld>
             <a:endParaRPr lang="en-GB"/>
           </a:p>
@@ -9983,7 +10097,7 @@
           <a:p>
             <a:r>
               <a:rPr lang="en-US" dirty="0"/>
-              <a:t>3.2.5 Use </a:t>
+              <a:t>3.2.4 Use </a:t>
             </a:r>
             <a:r>
               <a:rPr lang="en-US" dirty="0" err="1"/>
@@ -10019,7 +10133,7 @@
           <a:p>
             <a:fld id="{11EDCD7B-6966-E249-89F2-D46BDFBF56BE}" type="datetime1">
               <a:rPr lang="fi-FI" smtClean="0"/>
-              <a:t>5.2.2023</a:t>
+              <a:t>8.2.2023</a:t>
             </a:fld>
             <a:endParaRPr lang="en-GB" dirty="0"/>
           </a:p>
@@ -10103,15 +10217,15 @@
         </p:blipFill>
         <p:spPr>
           <a:xfrm>
-            <a:off x="2743200" y="1938685"/>
-            <a:ext cx="6348186" cy="4060239"/>
+            <a:off x="1099974" y="1632576"/>
+            <a:ext cx="9829283" cy="4437297"/>
           </a:xfrm>
         </p:spPr>
       </p:pic>
     </p:spTree>
     <p:extLst>
       <p:ext uri="{BB962C8B-B14F-4D97-AF65-F5344CB8AC3E}">
-        <p14:creationId xmlns:p14="http://schemas.microsoft.com/office/powerpoint/2010/main" val="4160019618"/>
+        <p14:creationId xmlns:p14="http://schemas.microsoft.com/office/powerpoint/2010/main" val="2027056133"/>
       </p:ext>
     </p:extLst>
   </p:cSld>
@@ -10161,7 +10275,7 @@
           <a:p>
             <a:r>
               <a:rPr lang="en-US" dirty="0"/>
-              <a:t>3.2.6 Use </a:t>
+              <a:t>3.2.5 Use </a:t>
             </a:r>
             <a:r>
               <a:rPr lang="en-US" dirty="0" err="1"/>
@@ -10169,7 +10283,7 @@
             </a:r>
             <a:r>
               <a:rPr lang="en-US" dirty="0"/>
-              <a:t> to run SQL to create the tables and populate with test data – Success?</a:t>
+              <a:t> to run SQL to create the tables and populate with test data</a:t>
             </a:r>
           </a:p>
         </p:txBody>
@@ -10197,7 +10311,7 @@
           <a:p>
             <a:fld id="{11EDCD7B-6966-E249-89F2-D46BDFBF56BE}" type="datetime1">
               <a:rPr lang="fi-FI" smtClean="0"/>
-              <a:t>5.2.2023</a:t>
+              <a:t>8.2.2023</a:t>
             </a:fld>
             <a:endParaRPr lang="en-GB" dirty="0"/>
           </a:p>
@@ -10281,8 +10395,186 @@
         </p:blipFill>
         <p:spPr>
           <a:xfrm>
-            <a:off x="2527355" y="1640595"/>
-            <a:ext cx="6251670" cy="4308892"/>
+            <a:off x="2142309" y="1554361"/>
+            <a:ext cx="7359718" cy="4444563"/>
+          </a:xfrm>
+        </p:spPr>
+      </p:pic>
+    </p:spTree>
+    <p:extLst>
+      <p:ext uri="{BB962C8B-B14F-4D97-AF65-F5344CB8AC3E}">
+        <p14:creationId xmlns:p14="http://schemas.microsoft.com/office/powerpoint/2010/main" val="4160019618"/>
+      </p:ext>
+    </p:extLst>
+  </p:cSld>
+  <p:clrMapOvr>
+    <a:masterClrMapping/>
+  </p:clrMapOvr>
+</p:sld>
+</file>
+
+<file path=ppt/slides/slide22.xml><?xml version="1.0" encoding="utf-8"?>
+<p:sld xmlns:a="http://schemas.openxmlformats.org/drawingml/2006/main" xmlns:r="http://schemas.openxmlformats.org/officeDocument/2006/relationships" xmlns:p="http://schemas.openxmlformats.org/presentationml/2006/main">
+  <p:cSld>
+    <p:spTree>
+      <p:nvGrpSpPr>
+        <p:cNvPr id="1" name=""/>
+        <p:cNvGrpSpPr/>
+        <p:nvPr/>
+      </p:nvGrpSpPr>
+      <p:grpSpPr>
+        <a:xfrm>
+          <a:off x="0" y="0"/>
+          <a:ext cx="0" cy="0"/>
+          <a:chOff x="0" y="0"/>
+          <a:chExt cx="0" cy="0"/>
+        </a:xfrm>
+      </p:grpSpPr>
+      <p:sp>
+        <p:nvSpPr>
+          <p:cNvPr id="2" name="Title 1">
+            <a:extLst>
+              <a:ext uri="{FF2B5EF4-FFF2-40B4-BE49-F238E27FC236}">
+                <a16:creationId xmlns:a16="http://schemas.microsoft.com/office/drawing/2014/main" id="{F717F6C3-2174-4E9B-955C-08E8869F5601}"/>
+              </a:ext>
+            </a:extLst>
+          </p:cNvPr>
+          <p:cNvSpPr>
+            <a:spLocks noGrp="1"/>
+          </p:cNvSpPr>
+          <p:nvPr>
+            <p:ph type="title"/>
+          </p:nvPr>
+        </p:nvSpPr>
+        <p:spPr/>
+        <p:txBody>
+          <a:bodyPr/>
+          <a:lstStyle/>
+          <a:p>
+            <a:r>
+              <a:rPr lang="en-US" dirty="0"/>
+              <a:t>3.2.6 Use </a:t>
+            </a:r>
+            <a:r>
+              <a:rPr lang="en-US" dirty="0" err="1"/>
+              <a:t>DBeaver</a:t>
+            </a:r>
+            <a:r>
+              <a:rPr lang="en-US" dirty="0"/>
+              <a:t> to run SQL to create the tables and populate with test data – Success?</a:t>
+            </a:r>
+          </a:p>
+        </p:txBody>
+      </p:sp>
+      <p:sp>
+        <p:nvSpPr>
+          <p:cNvPr id="4" name="Date Placeholder 3">
+            <a:extLst>
+              <a:ext uri="{FF2B5EF4-FFF2-40B4-BE49-F238E27FC236}">
+                <a16:creationId xmlns:a16="http://schemas.microsoft.com/office/drawing/2014/main" id="{4AE3CAC3-EE86-41D2-A811-3C7D35077D71}"/>
+              </a:ext>
+            </a:extLst>
+          </p:cNvPr>
+          <p:cNvSpPr>
+            <a:spLocks noGrp="1"/>
+          </p:cNvSpPr>
+          <p:nvPr>
+            <p:ph type="dt" sz="half" idx="10"/>
+          </p:nvPr>
+        </p:nvSpPr>
+        <p:spPr/>
+        <p:txBody>
+          <a:bodyPr/>
+          <a:lstStyle/>
+          <a:p>
+            <a:fld id="{11EDCD7B-6966-E249-89F2-D46BDFBF56BE}" type="datetime1">
+              <a:rPr lang="fi-FI" smtClean="0"/>
+              <a:t>8.2.2023</a:t>
+            </a:fld>
+            <a:endParaRPr lang="en-GB" dirty="0"/>
+          </a:p>
+        </p:txBody>
+      </p:sp>
+      <p:sp>
+        <p:nvSpPr>
+          <p:cNvPr id="5" name="Footer Placeholder 4">
+            <a:extLst>
+              <a:ext uri="{FF2B5EF4-FFF2-40B4-BE49-F238E27FC236}">
+                <a16:creationId xmlns:a16="http://schemas.microsoft.com/office/drawing/2014/main" id="{D420ABA2-0CF6-4B8C-A7C9-12490622B01A}"/>
+              </a:ext>
+            </a:extLst>
+          </p:cNvPr>
+          <p:cNvSpPr>
+            <a:spLocks noGrp="1"/>
+          </p:cNvSpPr>
+          <p:nvPr>
+            <p:ph type="ftr" sz="quarter" idx="11"/>
+          </p:nvPr>
+        </p:nvSpPr>
+        <p:spPr/>
+        <p:txBody>
+          <a:bodyPr/>
+          <a:lstStyle/>
+          <a:p>
+            <a:endParaRPr lang="en-GB" dirty="0"/>
+          </a:p>
+        </p:txBody>
+      </p:sp>
+      <p:sp>
+        <p:nvSpPr>
+          <p:cNvPr id="6" name="Slide Number Placeholder 5">
+            <a:extLst>
+              <a:ext uri="{FF2B5EF4-FFF2-40B4-BE49-F238E27FC236}">
+                <a16:creationId xmlns:a16="http://schemas.microsoft.com/office/drawing/2014/main" id="{4A3EFC30-E71D-4610-89FC-4C1D766BE40E}"/>
+              </a:ext>
+            </a:extLst>
+          </p:cNvPr>
+          <p:cNvSpPr>
+            <a:spLocks noGrp="1"/>
+          </p:cNvSpPr>
+          <p:nvPr>
+            <p:ph type="sldNum" sz="quarter" idx="12"/>
+          </p:nvPr>
+        </p:nvSpPr>
+        <p:spPr/>
+        <p:txBody>
+          <a:bodyPr/>
+          <a:lstStyle/>
+          <a:p>
+            <a:fld id="{76BAB7ED-EDE9-4D4B-9A2D-30E18C47C16E}" type="slidenum">
+              <a:rPr lang="en-GB" smtClean="0"/>
+              <a:t>22</a:t>
+            </a:fld>
+            <a:endParaRPr lang="en-GB" dirty="0"/>
+          </a:p>
+        </p:txBody>
+      </p:sp>
+      <p:pic>
+        <p:nvPicPr>
+          <p:cNvPr id="10" name="Content Placeholder 9">
+            <a:extLst>
+              <a:ext uri="{FF2B5EF4-FFF2-40B4-BE49-F238E27FC236}">
+                <a16:creationId xmlns:a16="http://schemas.microsoft.com/office/drawing/2014/main" id="{149C4C31-BF93-4F67-8EFD-89127E82DA9E}"/>
+              </a:ext>
+            </a:extLst>
+          </p:cNvPr>
+          <p:cNvPicPr>
+            <a:picLocks noGrp="1" noChangeAspect="1"/>
+          </p:cNvPicPr>
+          <p:nvPr>
+            <p:ph sz="half" idx="2"/>
+          </p:nvPr>
+        </p:nvPicPr>
+        <p:blipFill>
+          <a:blip r:embed="rId2"/>
+          <a:stretch>
+            <a:fillRect/>
+          </a:stretch>
+        </p:blipFill>
+        <p:spPr>
+          <a:xfrm>
+            <a:off x="1314994" y="1640595"/>
+            <a:ext cx="8987246" cy="4466240"/>
           </a:xfrm>
         </p:spPr>
       </p:pic>
@@ -10340,7 +10632,7 @@
         </p:spPr>
         <p:txBody>
           <a:bodyPr>
-            <a:normAutofit/>
+            <a:normAutofit fontScale="90000"/>
           </a:bodyPr>
           <a:lstStyle/>
           <a:p>
@@ -10392,6 +10684,79 @@
               <a:rPr lang="fi-FI" dirty="0"/>
               <a:t>…</a:t>
             </a:r>
+            <a:br>
+              <a:rPr lang="fi-FI" dirty="0"/>
+            </a:br>
+            <a:br>
+              <a:rPr lang="fi-FI" dirty="0"/>
+            </a:br>
+            <a:r>
+              <a:rPr lang="fi-FI" dirty="0"/>
+              <a:t>Here </a:t>
+            </a:r>
+            <a:r>
+              <a:rPr lang="fi-FI" dirty="0" err="1"/>
+              <a:t>the</a:t>
+            </a:r>
+            <a:r>
+              <a:rPr lang="fi-FI" dirty="0"/>
+              <a:t> Virtual</a:t>
+            </a:r>
+            <a:br>
+              <a:rPr lang="fi-FI" dirty="0"/>
+            </a:br>
+            <a:r>
+              <a:rPr lang="fi-FI" dirty="0"/>
+              <a:t>Machine </a:t>
+            </a:r>
+            <a:r>
+              <a:rPr lang="fi-FI" dirty="0" err="1"/>
+              <a:t>resources</a:t>
+            </a:r>
+            <a:br>
+              <a:rPr lang="fi-FI" dirty="0"/>
+            </a:br>
+            <a:r>
+              <a:rPr lang="fi-FI" dirty="0" err="1"/>
+              <a:t>selected</a:t>
+            </a:r>
+            <a:r>
+              <a:rPr lang="fi-FI" dirty="0"/>
+              <a:t>.</a:t>
+            </a:r>
+            <a:br>
+              <a:rPr lang="fi-FI" dirty="0"/>
+            </a:br>
+            <a:br>
+              <a:rPr lang="fi-FI" dirty="0"/>
+            </a:br>
+            <a:r>
+              <a:rPr lang="fi-FI" dirty="0"/>
+              <a:t>And </a:t>
+            </a:r>
+            <a:r>
+              <a:rPr lang="fi-FI" dirty="0" err="1"/>
+              <a:t>the</a:t>
+            </a:r>
+            <a:r>
+              <a:rPr lang="fi-FI" dirty="0"/>
+              <a:t> </a:t>
+            </a:r>
+            <a:r>
+              <a:rPr lang="fi-FI" dirty="0" err="1"/>
+              <a:t>Ubuntu</a:t>
+            </a:r>
+            <a:br>
+              <a:rPr lang="fi-FI" dirty="0"/>
+            </a:br>
+            <a:r>
+              <a:rPr lang="fi-FI" dirty="0" err="1"/>
+              <a:t>base</a:t>
+            </a:r>
+            <a:r>
+              <a:rPr lang="fi-FI" dirty="0"/>
+              <a:t> image.</a:t>
+            </a:r>
           </a:p>
         </p:txBody>
       </p:sp>
@@ -10418,7 +10783,7 @@
           <a:p>
             <a:fld id="{202E1EC2-47B8-044B-A09E-6A63B4D80C87}" type="datetime1">
               <a:rPr lang="fi-FI" smtClean="0"/>
-              <a:t>5.2.2023</a:t>
+              <a:t>8.2.2023</a:t>
             </a:fld>
             <a:endParaRPr lang="en-GB"/>
           </a:p>
@@ -10555,8 +10920,8 @@
         </p:nvSpPr>
         <p:spPr>
           <a:xfrm>
-            <a:off x="550863" y="549275"/>
-            <a:ext cx="11641137" cy="4449445"/>
+            <a:off x="148047" y="549275"/>
+            <a:ext cx="12043954" cy="4449445"/>
           </a:xfrm>
         </p:spPr>
         <p:txBody>
@@ -10595,11 +10960,11 @@
             </a:r>
             <a:r>
               <a:rPr lang="fi-FI" dirty="0"/>
-              <a:t> in </a:t>
+              <a:t> – </a:t>
             </a:r>
             <a:r>
               <a:rPr lang="fi-FI" dirty="0" err="1"/>
-              <a:t>the</a:t>
+              <a:t>strictish</a:t>
             </a:r>
             <a:r>
               <a:rPr lang="fi-FI" dirty="0"/>
@@ -10607,12 +10972,9 @@
             </a:r>
             <a:r>
               <a:rPr lang="fi-FI" dirty="0" err="1"/>
-              <a:t>cloud</a:t>
-            </a:r>
-            <a:r>
-              <a:rPr lang="fi-FI" dirty="0"/>
-              <a:t>…</a:t>
-            </a:r>
+              <a:t>Firewall</a:t>
+            </a:r>
+            <a:endParaRPr lang="fi-FI" dirty="0"/>
           </a:p>
         </p:txBody>
       </p:sp>
@@ -10639,7 +11001,7 @@
           <a:p>
             <a:fld id="{202E1EC2-47B8-044B-A09E-6A63B4D80C87}" type="datetime1">
               <a:rPr lang="fi-FI" smtClean="0"/>
-              <a:t>5.2.2023</a:t>
+              <a:t>8.2.2023</a:t>
             </a:fld>
             <a:endParaRPr lang="en-GB"/>
           </a:p>
@@ -10966,7 +11328,7 @@
           <a:p>
             <a:fld id="{202E1EC2-47B8-044B-A09E-6A63B4D80C87}" type="datetime1">
               <a:rPr lang="fi-FI" smtClean="0"/>
-              <a:t>5.2.2023</a:t>
+              <a:t>8.2.2023</a:t>
             </a:fld>
             <a:endParaRPr lang="en-GB"/>
           </a:p>
@@ -11123,7 +11485,7 @@
             </a:r>
             <a:r>
               <a:rPr lang="fi-FI" dirty="0" err="1"/>
-              <a:t>the</a:t>
+              <a:t>creation</a:t>
             </a:r>
             <a:r>
               <a:rPr lang="fi-FI" dirty="0"/>
@@ -11131,7 +11493,39 @@
             </a:r>
             <a:r>
               <a:rPr lang="fi-FI" dirty="0" err="1"/>
-              <a:t>creation</a:t>
+              <a:t>steps</a:t>
+            </a:r>
+            <a:r>
+              <a:rPr lang="fi-FI" dirty="0"/>
+              <a:t>. 70 DB </a:t>
+            </a:r>
+            <a:r>
+              <a:rPr lang="fi-FI" dirty="0" err="1"/>
+              <a:t>users</a:t>
+            </a:r>
+            <a:r>
+              <a:rPr lang="fi-FI" dirty="0"/>
+              <a:t> and </a:t>
+            </a:r>
+            <a:r>
+              <a:rPr lang="fi-FI" dirty="0" err="1"/>
+              <a:t>schema</a:t>
+            </a:r>
+            <a:r>
+              <a:rPr lang="fi-FI" dirty="0"/>
+              <a:t> for </a:t>
+            </a:r>
+            <a:r>
+              <a:rPr lang="fi-FI" dirty="0" err="1"/>
+              <a:t>each</a:t>
+            </a:r>
+            <a:r>
+              <a:rPr lang="fi-FI" dirty="0"/>
+              <a:t>. </a:t>
+            </a:r>
+            <a:r>
+              <a:rPr lang="fi-FI" dirty="0" err="1"/>
+              <a:t>Granting</a:t>
             </a:r>
             <a:r>
               <a:rPr lang="fi-FI" dirty="0"/>
@@ -11139,15 +11533,15 @@
             </a:r>
             <a:r>
               <a:rPr lang="fi-FI" dirty="0" err="1"/>
-              <a:t>steps</a:t>
+              <a:t>rights</a:t>
             </a:r>
             <a:r>
               <a:rPr lang="fi-FI" dirty="0"/>
-              <a:t> in </a:t>
+              <a:t> to </a:t>
             </a:r>
             <a:r>
               <a:rPr lang="fi-FI" dirty="0" err="1"/>
-              <a:t>the</a:t>
+              <a:t>that</a:t>
             </a:r>
             <a:r>
               <a:rPr lang="fi-FI" dirty="0"/>
@@ -11155,12 +11549,9 @@
             </a:r>
             <a:r>
               <a:rPr lang="fi-FI" dirty="0" err="1"/>
-              <a:t>cloud</a:t>
-            </a:r>
-            <a:r>
-              <a:rPr lang="fi-FI" dirty="0"/>
-              <a:t>…</a:t>
-            </a:r>
+              <a:t>schema</a:t>
+            </a:r>
+            <a:endParaRPr lang="fi-FI" dirty="0"/>
           </a:p>
         </p:txBody>
       </p:sp>
@@ -11187,7 +11578,7 @@
           <a:p>
             <a:fld id="{202E1EC2-47B8-044B-A09E-6A63B4D80C87}" type="datetime1">
               <a:rPr lang="fi-FI" smtClean="0"/>
-              <a:t>5.2.2023</a:t>
+              <a:t>8.2.2023</a:t>
             </a:fld>
             <a:endParaRPr lang="en-GB"/>
           </a:p>
@@ -11323,102 +11714,22 @@
             <p:ph type="title"/>
           </p:nvPr>
         </p:nvSpPr>
-        <p:spPr/>
-        <p:txBody>
-          <a:bodyPr/>
-          <a:lstStyle/>
-          <a:p>
-            <a:r>
-              <a:rPr lang="en-US" dirty="0"/>
-              <a:t>2. You need to install the needed tools…</a:t>
-            </a:r>
-          </a:p>
-        </p:txBody>
-      </p:sp>
-      <p:sp>
-        <p:nvSpPr>
-          <p:cNvPr id="3" name="Content Placeholder 2">
-            <a:extLst>
-              <a:ext uri="{FF2B5EF4-FFF2-40B4-BE49-F238E27FC236}">
-                <a16:creationId xmlns:a16="http://schemas.microsoft.com/office/drawing/2014/main" id="{42CDBE91-4611-44E5-8E59-A853C429DD70}"/>
-              </a:ext>
-            </a:extLst>
-          </p:cNvPr>
-          <p:cNvSpPr>
-            <a:spLocks noGrp="1"/>
-          </p:cNvSpPr>
-          <p:nvPr>
-            <p:ph sz="half" idx="2"/>
-          </p:nvPr>
-        </p:nvSpPr>
-        <p:spPr/>
-        <p:txBody>
-          <a:bodyPr/>
-          <a:lstStyle/>
-          <a:p>
-            <a:r>
-              <a:rPr lang="en-US" dirty="0"/>
-              <a:t>For database connection etc. these are needed:</a:t>
-            </a:r>
-          </a:p>
-          <a:p>
-            <a:r>
-              <a:rPr lang="en-US" dirty="0"/>
-              <a:t>(MariaDB or MySQL, if you want to install your own, instead of using my cloud DB)</a:t>
-            </a:r>
-          </a:p>
-          <a:p>
-            <a:r>
-              <a:rPr lang="en-US" b="1" dirty="0" err="1"/>
-              <a:t>ssh</a:t>
-            </a:r>
-            <a:r>
-              <a:rPr lang="en-US" dirty="0"/>
-              <a:t> – for tunnel creation. E.g. </a:t>
-            </a:r>
-            <a:r>
-              <a:rPr lang="en-US" dirty="0" err="1"/>
-              <a:t>GitBash</a:t>
-            </a:r>
-            <a:r>
-              <a:rPr lang="en-US" dirty="0"/>
-              <a:t> should have this. Maybe </a:t>
-            </a:r>
-            <a:r>
-              <a:rPr lang="en-US" dirty="0" err="1"/>
-              <a:t>Powershell</a:t>
-            </a:r>
-            <a:r>
-              <a:rPr lang="en-US" dirty="0"/>
-              <a:t> too</a:t>
-            </a:r>
-          </a:p>
-          <a:p>
-            <a:r>
-              <a:rPr lang="en-US" b="1" dirty="0" err="1"/>
-              <a:t>DBeaver</a:t>
-            </a:r>
-            <a:r>
-              <a:rPr lang="en-US" dirty="0"/>
-              <a:t> – </a:t>
-            </a:r>
-            <a:r>
-              <a:rPr lang="en-US" u="sng" dirty="0"/>
-              <a:t>Community Edition</a:t>
-            </a:r>
-            <a:r>
-              <a:rPr lang="en-US" dirty="0"/>
-              <a:t>. testing the tunnel connection, creating and filling the tables, and possibly creating ER diagrams, looking at the table data while testing, etc.</a:t>
-            </a:r>
-          </a:p>
-          <a:p>
-            <a:pPr marL="0" indent="0">
-              <a:buNone/>
-            </a:pPr>
-            <a:endParaRPr lang="en-US" dirty="0"/>
-          </a:p>
-          <a:p>
-            <a:endParaRPr lang="en-US" dirty="0"/>
+        <p:spPr>
+          <a:xfrm>
+            <a:off x="2462425" y="2689044"/>
+            <a:ext cx="7907382" cy="1223963"/>
+          </a:xfrm>
+        </p:spPr>
+        <p:txBody>
+          <a:bodyPr>
+            <a:normAutofit/>
+          </a:bodyPr>
+          <a:lstStyle/>
+          <a:p>
+            <a:r>
+              <a:rPr lang="en-US" sz="7200" dirty="0"/>
+              <a:t>YOUR PART STARTS HERE</a:t>
+            </a:r>
           </a:p>
         </p:txBody>
       </p:sp>
@@ -11445,7 +11756,7 @@
           <a:p>
             <a:fld id="{11EDCD7B-6966-E249-89F2-D46BDFBF56BE}" type="datetime1">
               <a:rPr lang="fi-FI" smtClean="0"/>
-              <a:t>5.2.2023</a:t>
+              <a:t>8.2.2023</a:t>
             </a:fld>
             <a:endParaRPr lang="en-GB" dirty="0"/>
           </a:p>
@@ -11558,219 +11869,96 @@
           <a:p>
             <a:r>
               <a:rPr lang="en-US" dirty="0"/>
-              <a:t>2. … and use </a:t>
+              <a:t>1. You need to install the needed tools…</a:t>
+            </a:r>
+          </a:p>
+        </p:txBody>
+      </p:sp>
+      <p:sp>
+        <p:nvSpPr>
+          <p:cNvPr id="3" name="Content Placeholder 2">
+            <a:extLst>
+              <a:ext uri="{FF2B5EF4-FFF2-40B4-BE49-F238E27FC236}">
+                <a16:creationId xmlns:a16="http://schemas.microsoft.com/office/drawing/2014/main" id="{42CDBE91-4611-44E5-8E59-A853C429DD70}"/>
+              </a:ext>
+            </a:extLst>
+          </p:cNvPr>
+          <p:cNvSpPr>
+            <a:spLocks noGrp="1"/>
+          </p:cNvSpPr>
+          <p:nvPr>
+            <p:ph sz="half" idx="2"/>
+          </p:nvPr>
+        </p:nvSpPr>
+        <p:spPr/>
+        <p:txBody>
+          <a:bodyPr/>
+          <a:lstStyle/>
+          <a:p>
+            <a:pPr marL="0" indent="0">
+              <a:buNone/>
+            </a:pPr>
+            <a:r>
+              <a:rPr lang="en-US" dirty="0"/>
+              <a:t>For database connection etc. these are needed:</a:t>
+            </a:r>
+          </a:p>
+          <a:p>
+            <a:r>
+              <a:rPr lang="en-US" dirty="0"/>
+              <a:t>(MariaDB or MySQL, if you want to install your own, instead of using my cloud DB)</a:t>
+            </a:r>
+          </a:p>
+          <a:p>
+            <a:r>
+              <a:rPr lang="en-US" b="1" dirty="0" err="1"/>
+              <a:t>ssh</a:t>
+            </a:r>
+            <a:r>
+              <a:rPr lang="en-US" dirty="0"/>
+              <a:t> – for tunnel creation. E.g. </a:t>
             </a:r>
             <a:r>
               <a:rPr lang="en-US" dirty="0" err="1"/>
-              <a:t>ssh</a:t>
+              <a:t>GitBash</a:t>
             </a:r>
             <a:r>
               <a:rPr lang="en-US" dirty="0"/>
-              <a:t> to create the tunnel </a:t>
-            </a:r>
-            <a:br>
+              <a:t> should have this. Maybe </a:t>
+            </a:r>
+            <a:r>
+              <a:rPr lang="en-US" dirty="0" err="1"/>
+              <a:t>Powershell</a:t>
+            </a:r>
+            <a:r>
               <a:rPr lang="en-US" dirty="0"/>
-            </a:br>
+              <a:t> too.</a:t>
+            </a:r>
+          </a:p>
+          <a:p>
+            <a:pPr lvl="1"/>
             <a:r>
               <a:rPr lang="en-US" dirty="0"/>
-              <a:t>(SSH port forwarding)</a:t>
-            </a:r>
-          </a:p>
-        </p:txBody>
-      </p:sp>
-      <p:sp>
-        <p:nvSpPr>
-          <p:cNvPr id="3" name="Content Placeholder 2">
-            <a:extLst>
-              <a:ext uri="{FF2B5EF4-FFF2-40B4-BE49-F238E27FC236}">
-                <a16:creationId xmlns:a16="http://schemas.microsoft.com/office/drawing/2014/main" id="{42CDBE91-4611-44E5-8E59-A853C429DD70}"/>
-              </a:ext>
-            </a:extLst>
-          </p:cNvPr>
-          <p:cNvSpPr>
-            <a:spLocks noGrp="1"/>
-          </p:cNvSpPr>
-          <p:nvPr>
-            <p:ph sz="half" idx="2"/>
-          </p:nvPr>
-        </p:nvSpPr>
-        <p:spPr/>
-        <p:txBody>
-          <a:bodyPr>
-            <a:normAutofit/>
-          </a:bodyPr>
-          <a:lstStyle/>
-          <a:p>
+              <a:t>Putty could also be used to create the tunnel.</a:t>
+            </a:r>
+          </a:p>
+          <a:p>
+            <a:r>
+              <a:rPr lang="en-US" b="1" dirty="0" err="1"/>
+              <a:t>DBeaver</a:t>
+            </a:r>
             <a:r>
               <a:rPr lang="en-US" dirty="0"/>
-              <a:t>The server only has 2 Linux users. You are going to use the normal user who has just normal rights</a:t>
-            </a:r>
-          </a:p>
-          <a:p>
+              <a:t> – </a:t>
+            </a:r>
+            <a:r>
+              <a:rPr lang="en-US" u="sng" dirty="0"/>
+              <a:t>Community Edition</a:t>
+            </a:r>
             <a:r>
               <a:rPr lang="en-US" dirty="0"/>
-              <a:t>Only port 22 open, thus you need to use the tunnel to connect to this MariaDB, </a:t>
-            </a:r>
-          </a:p>
-          <a:p>
-            <a:pPr lvl="1"/>
-            <a:r>
-              <a:rPr lang="en-US" dirty="0"/>
-              <a:t>cannot access 3306 directly</a:t>
-            </a:r>
-          </a:p>
-          <a:p>
-            <a:r>
-              <a:rPr lang="pt-BR" b="1" dirty="0"/>
-              <a:t>ssh -f </a:t>
-            </a:r>
-            <a:r>
-              <a:rPr lang="pt-BR" b="1" dirty="0">
-                <a:solidFill>
-                  <a:srgbClr val="FF0000"/>
-                </a:solidFill>
-              </a:rPr>
-              <a:t>jyser2</a:t>
-            </a:r>
-            <a:r>
-              <a:rPr lang="pt-BR" b="1" dirty="0"/>
-              <a:t>@</a:t>
-            </a:r>
-            <a:r>
-              <a:rPr lang="pt-BR" b="1" dirty="0">
-                <a:solidFill>
-                  <a:srgbClr val="FF0000"/>
-                </a:solidFill>
-              </a:rPr>
-              <a:t>86.50.229.46</a:t>
-            </a:r>
-            <a:r>
-              <a:rPr lang="pt-BR" b="1" dirty="0"/>
-              <a:t> -L </a:t>
-            </a:r>
-            <a:r>
-              <a:rPr lang="pt-BR" b="1" dirty="0">
-                <a:solidFill>
-                  <a:schemeClr val="accent1">
-                    <a:lumMod val="75000"/>
-                  </a:schemeClr>
-                </a:solidFill>
-              </a:rPr>
-              <a:t>3306</a:t>
-            </a:r>
-            <a:r>
-              <a:rPr lang="pt-BR" b="1" dirty="0"/>
-              <a:t>:localhost:</a:t>
-            </a:r>
-            <a:r>
-              <a:rPr lang="pt-BR" b="1" dirty="0">
-                <a:solidFill>
-                  <a:srgbClr val="FF0000"/>
-                </a:solidFill>
-              </a:rPr>
-              <a:t>3306</a:t>
-            </a:r>
-            <a:r>
-              <a:rPr lang="pt-BR" b="1" dirty="0"/>
-              <a:t> -N      </a:t>
-            </a:r>
-            <a:r>
-              <a:rPr lang="pt-BR" dirty="0"/>
-              <a:t>(Password given by teacher in Teams&gt;Files)</a:t>
-            </a:r>
-          </a:p>
-          <a:p>
-            <a:r>
-              <a:rPr lang="pt-BR" dirty="0"/>
-              <a:t>Red- and blue-marked parts change from case to case. E.g. If some other process has already taken port 3306 in your computer, you can use </a:t>
-            </a:r>
-            <a:r>
-              <a:rPr lang="pt-BR" dirty="0">
-                <a:solidFill>
-                  <a:schemeClr val="accent1">
-                    <a:lumMod val="75000"/>
-                  </a:schemeClr>
-                </a:solidFill>
-              </a:rPr>
-              <a:t>3308</a:t>
-            </a:r>
-            <a:r>
-              <a:rPr lang="pt-BR" dirty="0"/>
-              <a:t> as the first number.</a:t>
-            </a:r>
-          </a:p>
-          <a:p>
-            <a:r>
-              <a:rPr lang="pt-BR" dirty="0"/>
-              <a:t>Note! Your project .env and such setting must match with the created tunnel. In this case tunnel starts at localhost:</a:t>
-            </a:r>
-            <a:r>
-              <a:rPr lang="pt-BR" dirty="0">
-                <a:solidFill>
-                  <a:schemeClr val="accent1">
-                    <a:lumMod val="75000"/>
-                  </a:schemeClr>
-                </a:solidFill>
-              </a:rPr>
-              <a:t>3306</a:t>
-            </a:r>
-            <a:r>
-              <a:rPr lang="pt-BR" dirty="0"/>
-              <a:t>       (or </a:t>
-            </a:r>
-            <a:r>
-              <a:rPr lang="pt-BR" dirty="0">
-                <a:solidFill>
-                  <a:schemeClr val="accent1">
-                    <a:lumMod val="75000"/>
-                  </a:schemeClr>
-                </a:solidFill>
-              </a:rPr>
-              <a:t>3308</a:t>
-            </a:r>
-            <a:r>
-              <a:rPr lang="pt-BR" dirty="0"/>
-              <a:t>)</a:t>
-            </a:r>
-          </a:p>
-          <a:p>
-            <a:r>
-              <a:rPr lang="pt-BR" dirty="0"/>
-              <a:t>In a true Linux tool style the tunnel creation doesn’t show anything if no problems </a:t>
-            </a:r>
-            <a:r>
-              <a:rPr lang="pt-BR" dirty="0">
-                <a:sym typeface="Wingdings" panose="05000000000000000000" pitchFamily="2" charset="2"/>
-              </a:rPr>
-              <a:t></a:t>
-            </a:r>
-          </a:p>
-          <a:p>
-            <a:r>
-              <a:rPr lang="pt-BR" b="1" dirty="0">
-                <a:sym typeface="Wingdings" panose="05000000000000000000" pitchFamily="2" charset="2"/>
-              </a:rPr>
-              <a:t>lsof -i :3306</a:t>
-            </a:r>
-            <a:r>
-              <a:rPr lang="pt-BR" dirty="0">
-                <a:sym typeface="Wingdings" panose="05000000000000000000" pitchFamily="2" charset="2"/>
-              </a:rPr>
-              <a:t> (Linux) or </a:t>
-            </a:r>
-            <a:r>
-              <a:rPr lang="pt-BR" b="1" dirty="0">
-                <a:sym typeface="Wingdings" panose="05000000000000000000" pitchFamily="2" charset="2"/>
-              </a:rPr>
-              <a:t>netstat -aof | findstr :3306 </a:t>
-            </a:r>
-            <a:r>
-              <a:rPr lang="pt-BR" dirty="0">
-                <a:sym typeface="Wingdings" panose="05000000000000000000" pitchFamily="2" charset="2"/>
-              </a:rPr>
-              <a:t>(Windows) might help you check if tunnel process stil there</a:t>
-            </a:r>
-            <a:endParaRPr lang="en-US" dirty="0"/>
+              <a:t>. testing the tunnel connection, creating and filling the tables, and possibly creating ER diagrams, looking at the table data while testing, etc.</a:t>
+            </a:r>
           </a:p>
           <a:p>
             <a:pPr marL="0" indent="0">
@@ -11806,7 +11994,7 @@
           <a:p>
             <a:fld id="{11EDCD7B-6966-E249-89F2-D46BDFBF56BE}" type="datetime1">
               <a:rPr lang="fi-FI" smtClean="0"/>
-              <a:t>5.2.2023</a:t>
+              <a:t>8.2.2023</a:t>
             </a:fld>
             <a:endParaRPr lang="en-GB" dirty="0"/>
           </a:p>
@@ -11869,7 +12057,7 @@
     </p:spTree>
     <p:extLst>
       <p:ext uri="{BB962C8B-B14F-4D97-AF65-F5344CB8AC3E}">
-        <p14:creationId xmlns:p14="http://schemas.microsoft.com/office/powerpoint/2010/main" val="494203507"/>
+        <p14:creationId xmlns:p14="http://schemas.microsoft.com/office/powerpoint/2010/main" val="1251476600"/>
       </p:ext>
     </p:extLst>
   </p:cSld>
@@ -11927,8 +12115,228 @@
             </a:r>
             <a:r>
               <a:rPr lang="en-US" dirty="0"/>
-              <a:t> to create the tunnel</a:t>
-            </a:r>
+              <a:t> to create the tunnel </a:t>
+            </a:r>
+            <a:br>
+              <a:rPr lang="en-US" dirty="0"/>
+            </a:br>
+            <a:r>
+              <a:rPr lang="en-US" dirty="0"/>
+              <a:t>(SSH port forwarding)</a:t>
+            </a:r>
+          </a:p>
+        </p:txBody>
+      </p:sp>
+      <p:sp>
+        <p:nvSpPr>
+          <p:cNvPr id="3" name="Content Placeholder 2">
+            <a:extLst>
+              <a:ext uri="{FF2B5EF4-FFF2-40B4-BE49-F238E27FC236}">
+                <a16:creationId xmlns:a16="http://schemas.microsoft.com/office/drawing/2014/main" id="{42CDBE91-4611-44E5-8E59-A853C429DD70}"/>
+              </a:ext>
+            </a:extLst>
+          </p:cNvPr>
+          <p:cNvSpPr>
+            <a:spLocks noGrp="1"/>
+          </p:cNvSpPr>
+          <p:nvPr>
+            <p:ph sz="half" idx="2"/>
+          </p:nvPr>
+        </p:nvSpPr>
+        <p:spPr/>
+        <p:txBody>
+          <a:bodyPr>
+            <a:normAutofit/>
+          </a:bodyPr>
+          <a:lstStyle/>
+          <a:p>
+            <a:r>
+              <a:rPr lang="en-US" dirty="0"/>
+              <a:t>The server only has 2 Linux users. You can only use the normal user who has just normal rights</a:t>
+            </a:r>
+          </a:p>
+          <a:p>
+            <a:r>
+              <a:rPr lang="en-US" dirty="0"/>
+              <a:t>Only port :22 open, thus you’ll need to use the tunnel to connect to this remote MariaDB, </a:t>
+            </a:r>
+          </a:p>
+          <a:p>
+            <a:pPr lvl="1"/>
+            <a:r>
+              <a:rPr lang="en-US" dirty="0"/>
+              <a:t>cannot access :3306 directly, but need to create a tunnel to it.</a:t>
+            </a:r>
+          </a:p>
+          <a:p>
+            <a:r>
+              <a:rPr lang="pt-BR" b="1" dirty="0"/>
+              <a:t>ssh -f </a:t>
+            </a:r>
+            <a:r>
+              <a:rPr lang="pt-BR" b="1" dirty="0">
+                <a:solidFill>
+                  <a:srgbClr val="FF0000"/>
+                </a:solidFill>
+              </a:rPr>
+              <a:t>jyser2</a:t>
+            </a:r>
+            <a:r>
+              <a:rPr lang="pt-BR" b="1" dirty="0"/>
+              <a:t>@</a:t>
+            </a:r>
+            <a:r>
+              <a:rPr lang="pt-BR" b="1" dirty="0">
+                <a:solidFill>
+                  <a:srgbClr val="FF0000"/>
+                </a:solidFill>
+              </a:rPr>
+              <a:t>86.50.229.46</a:t>
+            </a:r>
+            <a:r>
+              <a:rPr lang="pt-BR" b="1" dirty="0"/>
+              <a:t> -L </a:t>
+            </a:r>
+            <a:r>
+              <a:rPr lang="pt-BR" b="1" dirty="0">
+                <a:solidFill>
+                  <a:schemeClr val="accent1">
+                    <a:lumMod val="75000"/>
+                  </a:schemeClr>
+                </a:solidFill>
+              </a:rPr>
+              <a:t>3306</a:t>
+            </a:r>
+            <a:r>
+              <a:rPr lang="pt-BR" b="1" dirty="0"/>
+              <a:t>:localhost:</a:t>
+            </a:r>
+            <a:r>
+              <a:rPr lang="pt-BR" b="1" dirty="0">
+                <a:solidFill>
+                  <a:srgbClr val="FF0000"/>
+                </a:solidFill>
+              </a:rPr>
+              <a:t>3306</a:t>
+            </a:r>
+            <a:r>
+              <a:rPr lang="pt-BR" b="1" dirty="0"/>
+              <a:t> -N      </a:t>
+            </a:r>
+            <a:r>
+              <a:rPr lang="pt-BR" dirty="0"/>
+              <a:t>(Password given by teacher in Teams&gt;Files)</a:t>
+            </a:r>
+          </a:p>
+          <a:p>
+            <a:r>
+              <a:rPr lang="pt-BR" dirty="0"/>
+              <a:t>Red- and blue-marked parts might change from case to case. E.g. If some other process has already taken port 3306 in your computer, you can use </a:t>
+            </a:r>
+            <a:r>
+              <a:rPr lang="pt-BR" b="1" dirty="0">
+                <a:solidFill>
+                  <a:schemeClr val="accent1">
+                    <a:lumMod val="75000"/>
+                  </a:schemeClr>
+                </a:solidFill>
+              </a:rPr>
+              <a:t>3308</a:t>
+            </a:r>
+            <a:r>
+              <a:rPr lang="pt-BR" dirty="0"/>
+              <a:t> as the </a:t>
+            </a:r>
+            <a:r>
+              <a:rPr lang="pt-BR" u="sng" dirty="0"/>
+              <a:t>first</a:t>
+            </a:r>
+            <a:r>
+              <a:rPr lang="pt-BR" dirty="0"/>
+              <a:t> number.</a:t>
+            </a:r>
+          </a:p>
+          <a:p>
+            <a:r>
+              <a:rPr lang="pt-BR" dirty="0"/>
+              <a:t>Note! Your project .env and such setting must match with the created tunnel. In this case tunnel starts at localhost and </a:t>
+            </a:r>
+            <a:r>
+              <a:rPr lang="pt-BR" b="1" dirty="0">
+                <a:solidFill>
+                  <a:schemeClr val="accent1">
+                    <a:lumMod val="75000"/>
+                  </a:schemeClr>
+                </a:solidFill>
+              </a:rPr>
+              <a:t>3306</a:t>
+            </a:r>
+            <a:r>
+              <a:rPr lang="pt-BR" dirty="0"/>
+              <a:t>       (or </a:t>
+            </a:r>
+            <a:r>
+              <a:rPr lang="pt-BR" dirty="0">
+                <a:solidFill>
+                  <a:schemeClr val="accent1">
+                    <a:lumMod val="75000"/>
+                  </a:schemeClr>
+                </a:solidFill>
+              </a:rPr>
+              <a:t>3308</a:t>
+            </a:r>
+            <a:r>
+              <a:rPr lang="pt-BR" dirty="0"/>
+              <a:t>)</a:t>
+            </a:r>
+          </a:p>
+          <a:p>
+            <a:r>
+              <a:rPr lang="pt-BR" dirty="0"/>
+              <a:t>In a true Linux program style the tunnel creation doesn’t show anything if no problems </a:t>
+            </a:r>
+            <a:r>
+              <a:rPr lang="pt-BR" dirty="0">
+                <a:sym typeface="Wingdings" panose="05000000000000000000" pitchFamily="2" charset="2"/>
+              </a:rPr>
+              <a:t></a:t>
+            </a:r>
+          </a:p>
+          <a:p>
+            <a:r>
+              <a:rPr lang="pt-BR" b="1" dirty="0">
+                <a:sym typeface="Wingdings" panose="05000000000000000000" pitchFamily="2" charset="2"/>
+              </a:rPr>
+              <a:t>lsof -i :3306</a:t>
+            </a:r>
+            <a:r>
+              <a:rPr lang="pt-BR" dirty="0">
+                <a:sym typeface="Wingdings" panose="05000000000000000000" pitchFamily="2" charset="2"/>
+              </a:rPr>
+              <a:t> (Linux) or </a:t>
+            </a:r>
+            <a:r>
+              <a:rPr lang="pt-BR" b="1" dirty="0">
+                <a:sym typeface="Wingdings" panose="05000000000000000000" pitchFamily="2" charset="2"/>
+              </a:rPr>
+              <a:t>netstat -aof | findstr :3306 </a:t>
+            </a:r>
+            <a:r>
+              <a:rPr lang="pt-BR" dirty="0">
+                <a:sym typeface="Wingdings" panose="05000000000000000000" pitchFamily="2" charset="2"/>
+              </a:rPr>
+              <a:t>(Windows) might help you check if tunnel process stil there</a:t>
+            </a:r>
+            <a:endParaRPr lang="en-US" dirty="0"/>
+          </a:p>
+          <a:p>
+            <a:pPr marL="0" indent="0">
+              <a:buNone/>
+            </a:pPr>
+            <a:endParaRPr lang="en-US" dirty="0"/>
+          </a:p>
+          <a:p>
+            <a:endParaRPr lang="en-US" dirty="0"/>
           </a:p>
         </p:txBody>
       </p:sp>
@@ -11955,7 +12363,7 @@
           <a:p>
             <a:fld id="{11EDCD7B-6966-E249-89F2-D46BDFBF56BE}" type="datetime1">
               <a:rPr lang="fi-FI" smtClean="0"/>
-              <a:t>5.2.2023</a:t>
+              <a:t>8.2.2023</a:t>
             </a:fld>
             <a:endParaRPr lang="en-GB" dirty="0"/>
           </a:p>
@@ -12015,111 +12423,10 @@
           </a:p>
         </p:txBody>
       </p:sp>
-      <p:pic>
-        <p:nvPicPr>
-          <p:cNvPr id="10" name="Content Placeholder 9">
-            <a:extLst>
-              <a:ext uri="{FF2B5EF4-FFF2-40B4-BE49-F238E27FC236}">
-                <a16:creationId xmlns:a16="http://schemas.microsoft.com/office/drawing/2014/main" id="{E75DF62D-C821-4436-80ED-B904E2C29647}"/>
-              </a:ext>
-            </a:extLst>
-          </p:cNvPr>
-          <p:cNvPicPr>
-            <a:picLocks noGrp="1" noChangeAspect="1"/>
-          </p:cNvPicPr>
-          <p:nvPr>
-            <p:ph sz="half" idx="2"/>
-          </p:nvPr>
-        </p:nvPicPr>
-        <p:blipFill>
-          <a:blip r:embed="rId2"/>
-          <a:stretch>
-            <a:fillRect/>
-          </a:stretch>
-        </p:blipFill>
-        <p:spPr>
-          <a:xfrm>
-            <a:off x="659170" y="1222884"/>
-            <a:ext cx="10516140" cy="2355971"/>
-          </a:xfrm>
-        </p:spPr>
-      </p:pic>
-      <p:pic>
-        <p:nvPicPr>
-          <p:cNvPr id="12" name="Picture 11">
-            <a:extLst>
-              <a:ext uri="{FF2B5EF4-FFF2-40B4-BE49-F238E27FC236}">
-                <a16:creationId xmlns:a16="http://schemas.microsoft.com/office/drawing/2014/main" id="{E7ABA486-BD10-4334-AAB0-FCB5D9C6F7AF}"/>
-              </a:ext>
-            </a:extLst>
-          </p:cNvPr>
-          <p:cNvPicPr>
-            <a:picLocks noChangeAspect="1"/>
-          </p:cNvPicPr>
-          <p:nvPr/>
-        </p:nvPicPr>
-        <p:blipFill>
-          <a:blip r:embed="rId3"/>
-          <a:stretch>
-            <a:fillRect/>
-          </a:stretch>
-        </p:blipFill>
-        <p:spPr>
-          <a:xfrm>
-            <a:off x="373620" y="4238421"/>
-            <a:ext cx="11189275" cy="1744271"/>
-          </a:xfrm>
-          <a:prstGeom prst="rect">
-            <a:avLst/>
-          </a:prstGeom>
-        </p:spPr>
-      </p:pic>
-      <p:sp>
-        <p:nvSpPr>
-          <p:cNvPr id="13" name="Rectangle 12">
-            <a:extLst>
-              <a:ext uri="{FF2B5EF4-FFF2-40B4-BE49-F238E27FC236}">
-                <a16:creationId xmlns:a16="http://schemas.microsoft.com/office/drawing/2014/main" id="{6F4FE023-1F2A-42D7-8DD2-AE1E0ED188B8}"/>
-              </a:ext>
-            </a:extLst>
-          </p:cNvPr>
-          <p:cNvSpPr/>
-          <p:nvPr/>
-        </p:nvSpPr>
-        <p:spPr>
-          <a:xfrm>
-            <a:off x="1292318" y="3699934"/>
-            <a:ext cx="8648521" cy="369332"/>
-          </a:xfrm>
-          <a:prstGeom prst="rect">
-            <a:avLst/>
-          </a:prstGeom>
-        </p:spPr>
-        <p:txBody>
-          <a:bodyPr wrap="none">
-            <a:spAutoFit/>
-          </a:bodyPr>
-          <a:lstStyle/>
-          <a:p>
-            <a:r>
-              <a:rPr lang="en-US" dirty="0"/>
-              <a:t>netstat -</a:t>
-            </a:r>
-            <a:r>
-              <a:rPr lang="en-US" dirty="0" err="1"/>
-              <a:t>aof</a:t>
-            </a:r>
-            <a:r>
-              <a:rPr lang="en-US" dirty="0"/>
-              <a:t> in Windows might take some time to produce results. Reason unknown.</a:t>
-            </a:r>
-          </a:p>
-        </p:txBody>
-      </p:sp>
     </p:spTree>
     <p:extLst>
       <p:ext uri="{BB962C8B-B14F-4D97-AF65-F5344CB8AC3E}">
-        <p14:creationId xmlns:p14="http://schemas.microsoft.com/office/powerpoint/2010/main" val="1180610041"/>
+        <p14:creationId xmlns:p14="http://schemas.microsoft.com/office/powerpoint/2010/main" val="494203507"/>
       </p:ext>
     </p:extLst>
   </p:cSld>
@@ -12686,24 +12993,6 @@
 </file>
 
 <file path=customXml/item1.xml><?xml version="1.0" encoding="utf-8"?>
-<?mso-contentType ?>
-<FormTemplates xmlns="http://schemas.microsoft.com/sharepoint/v3/contenttype/forms">
-  <Display>DocumentLibraryForm</Display>
-  <Edit>DocumentLibraryForm</Edit>
-  <New>DocumentLibraryForm</New>
-</FormTemplates>
-</file>
-
-<file path=customXml/item2.xml><?xml version="1.0" encoding="utf-8"?>
-<p:properties xmlns:p="http://schemas.microsoft.com/office/2006/metadata/properties" xmlns:xsi="http://www.w3.org/2001/XMLSchema-instance" xmlns:pc="http://schemas.microsoft.com/office/infopath/2007/PartnerControls">
-  <documentManagement>
-    <PublishingExpirationDate xmlns="http://schemas.microsoft.com/sharepoint/v3" xsi:nil="true"/>
-    <PublishingStartDate xmlns="http://schemas.microsoft.com/sharepoint/v3" xsi:nil="true"/>
-  </documentManagement>
-</p:properties>
-</file>
-
-<file path=customXml/item3.xml><?xml version="1.0" encoding="utf-8"?>
 <ct:contentTypeSchema xmlns:ct="http://schemas.microsoft.com/office/2006/metadata/contentType" xmlns:ma="http://schemas.microsoft.com/office/2006/metadata/properties/metaAttributes" ct:_="" ma:_="" ma:contentTypeName="Document" ma:contentTypeID="0x01010024C55B41993A414DABB8DD07ACBA0814" ma:contentTypeVersion="1" ma:contentTypeDescription="Create a new document." ma:contentTypeScope="" ma:versionID="3ea0c22b5866975a7b271665de4056c5">
   <xsd:schema xmlns:xsd="http://www.w3.org/2001/XMLSchema" xmlns:xs="http://www.w3.org/2001/XMLSchema" xmlns:p="http://schemas.microsoft.com/office/2006/metadata/properties" xmlns:ns1="http://schemas.microsoft.com/sharepoint/v3" targetNamespace="http://schemas.microsoft.com/office/2006/metadata/properties" ma:root="true" ma:fieldsID="ef2aa9ed40e72a78c3822fc753b43e87" ns1:_="">
     <xsd:import namespace="http://schemas.microsoft.com/sharepoint/v3"/>
@@ -12835,10 +13124,38 @@
 </ct:contentTypeSchema>
 </file>
 
+<file path=customXml/item2.xml><?xml version="1.0" encoding="utf-8"?>
+<p:properties xmlns:p="http://schemas.microsoft.com/office/2006/metadata/properties" xmlns:xsi="http://www.w3.org/2001/XMLSchema-instance" xmlns:pc="http://schemas.microsoft.com/office/infopath/2007/PartnerControls">
+  <documentManagement>
+    <PublishingExpirationDate xmlns="http://schemas.microsoft.com/sharepoint/v3" xsi:nil="true"/>
+    <PublishingStartDate xmlns="http://schemas.microsoft.com/sharepoint/v3" xsi:nil="true"/>
+  </documentManagement>
+</p:properties>
+</file>
+
+<file path=customXml/item3.xml><?xml version="1.0" encoding="utf-8"?>
+<?mso-contentType ?>
+<FormTemplates xmlns="http://schemas.microsoft.com/sharepoint/v3/contenttype/forms">
+  <Display>DocumentLibraryForm</Display>
+  <Edit>DocumentLibraryForm</Edit>
+  <New>DocumentLibraryForm</New>
+</FormTemplates>
+</file>
+
 <file path=customXml/itemProps1.xml><?xml version="1.0" encoding="utf-8"?>
-<ds:datastoreItem xmlns:ds="http://schemas.openxmlformats.org/officeDocument/2006/customXml" ds:itemID="{D546C03B-CD3A-4EA0-AAA4-0E00E896454E}">
+<ds:datastoreItem xmlns:ds="http://schemas.openxmlformats.org/officeDocument/2006/customXml" ds:itemID="{B9E4DC25-62AA-44A0-8D5C-DB44892588AF}">
   <ds:schemaRefs>
-    <ds:schemaRef ds:uri="http://schemas.microsoft.com/sharepoint/v3/contenttype/forms"/>
+    <ds:schemaRef ds:uri="http://schemas.microsoft.com/office/2006/metadata/contentType"/>
+    <ds:schemaRef ds:uri="http://schemas.microsoft.com/office/2006/metadata/properties/metaAttributes"/>
+    <ds:schemaRef ds:uri="http://www.w3.org/2001/XMLSchema"/>
+    <ds:schemaRef ds:uri="http://schemas.microsoft.com/office/2006/metadata/properties"/>
+    <ds:schemaRef ds:uri="http://schemas.microsoft.com/sharepoint/v3"/>
+    <ds:schemaRef ds:uri="http://schemas.microsoft.com/office/2006/documentManagement/types"/>
+    <ds:schemaRef ds:uri="http://schemas.microsoft.com/office/infopath/2007/PartnerControls"/>
+    <ds:schemaRef ds:uri="http://schemas.openxmlformats.org/package/2006/metadata/core-properties"/>
+    <ds:schemaRef ds:uri="http://purl.org/dc/elements/1.1/"/>
+    <ds:schemaRef ds:uri="http://purl.org/dc/terms/"/>
+    <ds:schemaRef ds:uri="http://schemas.microsoft.com/internal/obd"/>
   </ds:schemaRefs>
 </ds:datastoreItem>
 </file>
@@ -12860,19 +13177,9 @@
 </file>
 
 <file path=customXml/itemProps3.xml><?xml version="1.0" encoding="utf-8"?>
-<ds:datastoreItem xmlns:ds="http://schemas.openxmlformats.org/officeDocument/2006/customXml" ds:itemID="{B9E4DC25-62AA-44A0-8D5C-DB44892588AF}">
+<ds:datastoreItem xmlns:ds="http://schemas.openxmlformats.org/officeDocument/2006/customXml" ds:itemID="{D546C03B-CD3A-4EA0-AAA4-0E00E896454E}">
   <ds:schemaRefs>
-    <ds:schemaRef ds:uri="http://schemas.microsoft.com/office/2006/metadata/contentType"/>
-    <ds:schemaRef ds:uri="http://schemas.microsoft.com/office/2006/metadata/properties/metaAttributes"/>
-    <ds:schemaRef ds:uri="http://www.w3.org/2001/XMLSchema"/>
-    <ds:schemaRef ds:uri="http://schemas.microsoft.com/office/2006/metadata/properties"/>
-    <ds:schemaRef ds:uri="http://schemas.microsoft.com/sharepoint/v3"/>
-    <ds:schemaRef ds:uri="http://schemas.microsoft.com/office/2006/documentManagement/types"/>
-    <ds:schemaRef ds:uri="http://schemas.microsoft.com/office/infopath/2007/PartnerControls"/>
-    <ds:schemaRef ds:uri="http://schemas.openxmlformats.org/package/2006/metadata/core-properties"/>
-    <ds:schemaRef ds:uri="http://purl.org/dc/elements/1.1/"/>
-    <ds:schemaRef ds:uri="http://purl.org/dc/terms/"/>
-    <ds:schemaRef ds:uri="http://schemas.microsoft.com/internal/obd"/>
+    <ds:schemaRef ds:uri="http://schemas.microsoft.com/sharepoint/v3/contenttype/forms"/>
   </ds:schemaRefs>
 </ds:datastoreItem>
 </file>
</xml_diff>